<commit_message>
* modified time table in PPT
</commit_message>
<xml_diff>
--- a/source/images/images.pptx
+++ b/source/images/images.pptx
@@ -4878,14 +4878,10 @@
         <a:lstStyle/>
         <a:p>
           <a:r>
-            <a:rPr lang="de-DE" sz="1800" smtClean="0"/>
-            <a:t>Freitag, </a:t>
+            <a:rPr lang="de-DE" sz="1800" dirty="0" smtClean="0"/>
+            <a:t>Freitag, 15.10.10</a:t>
           </a:r>
-          <a:r>
-            <a:rPr lang="de-DE" sz="1800" smtClean="0"/>
-            <a:t>16.10.09</a:t>
-          </a:r>
-          <a:endParaRPr lang="de-DE" sz="1800"/>
+          <a:endParaRPr lang="de-DE" sz="1800" dirty="0"/>
         </a:p>
       </dgm:t>
     </dgm:pt>
@@ -4961,10 +4957,10 @@
         <a:lstStyle/>
         <a:p>
           <a:r>
-            <a:rPr lang="de-DE" smtClean="0"/>
-            <a:t>19 Uhr Kennenlernen</a:t>
+            <a:rPr lang="de-DE" dirty="0" smtClean="0"/>
+            <a:t>ab 19 Uhr Kennenlernen</a:t>
           </a:r>
-          <a:endParaRPr lang="de-DE"/>
+          <a:endParaRPr lang="de-DE" dirty="0"/>
         </a:p>
       </dgm:t>
     </dgm:pt>
@@ -5002,18 +4998,114 @@
         <a:lstStyle/>
         <a:p>
           <a:r>
-            <a:rPr lang="de-DE" sz="1800" smtClean="0"/>
-            <a:t>Samstag, </a:t>
+            <a:rPr lang="de-DE" sz="1800" dirty="0" smtClean="0"/>
+            <a:t>Samstag, 16.10.10</a:t>
+          </a:r>
+          <a:endParaRPr lang="de-DE" sz="1800" dirty="0"/>
+        </a:p>
+      </dgm:t>
+    </dgm:pt>
+    <dgm:pt modelId="{C40326C5-DD2C-4AA0-B8FA-32B998545FA0}" type="parTrans" cxnId="{5873C298-DD16-4C37-A639-3FA8A0BC83BD}">
+      <dgm:prSet/>
+      <dgm:spPr/>
+      <dgm:t>
+        <a:bodyPr/>
+        <a:lstStyle/>
+        <a:p>
+          <a:endParaRPr lang="de-DE"/>
+        </a:p>
+      </dgm:t>
+    </dgm:pt>
+    <dgm:pt modelId="{F5FCA406-B798-4646-A7B9-B57F2DF147EE}" type="sibTrans" cxnId="{5873C298-DD16-4C37-A639-3FA8A0BC83BD}">
+      <dgm:prSet/>
+      <dgm:spPr/>
+      <dgm:t>
+        <a:bodyPr/>
+        <a:lstStyle/>
+        <a:p>
+          <a:endParaRPr lang="de-DE"/>
+        </a:p>
+      </dgm:t>
+    </dgm:pt>
+    <dgm:pt modelId="{2106692C-4A97-4081-B6B6-88556F2D42AC}">
+      <dgm:prSet phldrT="[Text]"/>
+      <dgm:spPr>
+        <a:solidFill>
+          <a:srgbClr val="A12D0D"/>
+        </a:solidFill>
+      </dgm:spPr>
+      <dgm:t>
+        <a:bodyPr/>
+        <a:lstStyle/>
+        <a:p>
+          <a:r>
+            <a:rPr lang="de-DE" dirty="0" smtClean="0"/>
+            <a:t>8 Uhr</a:t>
+          </a:r>
+          <a:br>
+            <a:rPr lang="de-DE" dirty="0" smtClean="0"/>
+          </a:br>
+          <a:r>
+            <a:rPr lang="de-DE" dirty="0" smtClean="0"/>
+            <a:t>Smalltalk</a:t>
+          </a:r>
+          <a:endParaRPr lang="de-DE" dirty="0"/>
+        </a:p>
+      </dgm:t>
+    </dgm:pt>
+    <dgm:pt modelId="{89E54B7C-510B-4279-90DE-25D9A647AFB7}" type="parTrans" cxnId="{9BD2E0EC-5B5D-4375-9989-402430F1A8DE}">
+      <dgm:prSet/>
+      <dgm:spPr/>
+      <dgm:t>
+        <a:bodyPr/>
+        <a:lstStyle/>
+        <a:p>
+          <a:endParaRPr lang="de-DE"/>
+        </a:p>
+      </dgm:t>
+    </dgm:pt>
+    <dgm:pt modelId="{1D955D5B-7B30-4BA9-A9A2-98B7FD491E83}" type="sibTrans" cxnId="{9BD2E0EC-5B5D-4375-9989-402430F1A8DE}">
+      <dgm:prSet/>
+      <dgm:spPr/>
+      <dgm:t>
+        <a:bodyPr/>
+        <a:lstStyle/>
+        <a:p>
+          <a:endParaRPr lang="de-DE"/>
+        </a:p>
+      </dgm:t>
+    </dgm:pt>
+    <dgm:pt modelId="{68D82425-9852-4F68-B54C-85805ED66BE1}">
+      <dgm:prSet phldrT="[Text]"/>
+      <dgm:spPr>
+        <a:solidFill>
+          <a:srgbClr val="A12D0D"/>
+        </a:solidFill>
+      </dgm:spPr>
+      <dgm:t>
+        <a:bodyPr/>
+        <a:lstStyle/>
+        <a:p>
+          <a:r>
+            <a:rPr lang="de-DE" dirty="0" smtClean="0"/>
+            <a:t>10 </a:t>
           </a:r>
           <a:r>
-            <a:rPr lang="de-DE" sz="1800" smtClean="0"/>
-            <a:t>17.10.09</a:t>
+            <a:rPr lang="de-DE" dirty="0" smtClean="0"/>
+            <a:t>– 19 Uhr</a:t>
           </a:r>
-          <a:endParaRPr lang="de-DE" sz="1800"/>
-        </a:p>
-      </dgm:t>
-    </dgm:pt>
-    <dgm:pt modelId="{C40326C5-DD2C-4AA0-B8FA-32B998545FA0}" type="parTrans" cxnId="{5873C298-DD16-4C37-A639-3FA8A0BC83BD}">
+          <a:br>
+            <a:rPr lang="de-DE" dirty="0" smtClean="0"/>
+          </a:br>
+          <a:r>
+            <a:rPr lang="de-DE" dirty="0" smtClean="0"/>
+            <a:t>Open Spaces</a:t>
+          </a:r>
+          <a:endParaRPr lang="de-DE" dirty="0"/>
+        </a:p>
+      </dgm:t>
+    </dgm:pt>
+    <dgm:pt modelId="{969570D0-428E-4654-9CFD-04A760CE5848}" type="parTrans" cxnId="{37F09132-B638-41A4-93A0-33CC37B0F082}">
       <dgm:prSet/>
       <dgm:spPr/>
       <dgm:t>
@@ -5024,7 +5116,7 @@
         </a:p>
       </dgm:t>
     </dgm:pt>
-    <dgm:pt modelId="{F5FCA406-B798-4646-A7B9-B57F2DF147EE}" type="sibTrans" cxnId="{5873C298-DD16-4C37-A639-3FA8A0BC83BD}">
+    <dgm:pt modelId="{4E77B1EC-CC8F-4469-896A-3DF6F764B8B3}" type="sibTrans" cxnId="{37F09132-B638-41A4-93A0-33CC37B0F082}">
       <dgm:prSet/>
       <dgm:spPr/>
       <dgm:t>
@@ -5035,7 +5127,96 @@
         </a:p>
       </dgm:t>
     </dgm:pt>
-    <dgm:pt modelId="{2106692C-4A97-4081-B6B6-88556F2D42AC}">
+    <dgm:pt modelId="{CBB4AAEA-6945-4B7A-853B-45EAE2FC7928}">
+      <dgm:prSet phldrT="[Text]"/>
+      <dgm:spPr>
+        <a:solidFill>
+          <a:srgbClr val="A12D0D"/>
+        </a:solidFill>
+      </dgm:spPr>
+      <dgm:t>
+        <a:bodyPr/>
+        <a:lstStyle/>
+        <a:p>
+          <a:r>
+            <a:rPr lang="de-DE" smtClean="0"/>
+            <a:t>20 Uhr</a:t>
+          </a:r>
+          <a:br>
+            <a:rPr lang="de-DE" smtClean="0"/>
+          </a:br>
+          <a:r>
+            <a:rPr lang="de-DE" smtClean="0"/>
+            <a:t>Party</a:t>
+          </a:r>
+          <a:endParaRPr lang="de-DE"/>
+        </a:p>
+      </dgm:t>
+    </dgm:pt>
+    <dgm:pt modelId="{A4CF9BF0-DC2C-4101-B10B-817E6BD7AF35}" type="parTrans" cxnId="{FC534336-F1E1-42ED-862C-2ACE7909732F}">
+      <dgm:prSet/>
+      <dgm:spPr/>
+      <dgm:t>
+        <a:bodyPr/>
+        <a:lstStyle/>
+        <a:p>
+          <a:endParaRPr lang="de-DE"/>
+        </a:p>
+      </dgm:t>
+    </dgm:pt>
+    <dgm:pt modelId="{A6E04AF2-2B25-4125-B635-533A97CCF887}" type="sibTrans" cxnId="{FC534336-F1E1-42ED-862C-2ACE7909732F}">
+      <dgm:prSet/>
+      <dgm:spPr/>
+      <dgm:t>
+        <a:bodyPr/>
+        <a:lstStyle/>
+        <a:p>
+          <a:endParaRPr lang="de-DE"/>
+        </a:p>
+      </dgm:t>
+    </dgm:pt>
+    <dgm:pt modelId="{EBDBBDD9-E8CD-4891-A7C5-AFB462A5105D}">
+      <dgm:prSet phldrT="[Text]" custT="1"/>
+      <dgm:spPr>
+        <a:solidFill>
+          <a:srgbClr val="E1DF9E"/>
+        </a:solidFill>
+      </dgm:spPr>
+      <dgm:t>
+        <a:bodyPr/>
+        <a:lstStyle/>
+        <a:p>
+          <a:r>
+            <a:rPr lang="de-DE" sz="1800" dirty="0" smtClean="0"/>
+            <a:t>Sonntag, 17.10.10</a:t>
+          </a:r>
+          <a:endParaRPr lang="de-DE" sz="1800" dirty="0"/>
+        </a:p>
+      </dgm:t>
+    </dgm:pt>
+    <dgm:pt modelId="{C96B452C-89C5-49B1-9E14-425649B7BB19}" type="parTrans" cxnId="{71A5DB8C-3FBA-4224-8D9E-120078F27163}">
+      <dgm:prSet/>
+      <dgm:spPr/>
+      <dgm:t>
+        <a:bodyPr/>
+        <a:lstStyle/>
+        <a:p>
+          <a:endParaRPr lang="de-DE"/>
+        </a:p>
+      </dgm:t>
+    </dgm:pt>
+    <dgm:pt modelId="{1982359C-F519-4381-B8C4-D632F5CCE6F1}" type="sibTrans" cxnId="{71A5DB8C-3FBA-4224-8D9E-120078F27163}">
+      <dgm:prSet/>
+      <dgm:spPr/>
+      <dgm:t>
+        <a:bodyPr/>
+        <a:lstStyle/>
+        <a:p>
+          <a:endParaRPr lang="de-DE"/>
+        </a:p>
+      </dgm:t>
+    </dgm:pt>
+    <dgm:pt modelId="{B8D10FDE-6E32-4F84-B637-86F1E1DA8F83}">
       <dgm:prSet phldrT="[Text]"/>
       <dgm:spPr>
         <a:solidFill>
@@ -5061,199 +5242,6 @@
         </a:p>
       </dgm:t>
     </dgm:pt>
-    <dgm:pt modelId="{89E54B7C-510B-4279-90DE-25D9A647AFB7}" type="parTrans" cxnId="{9BD2E0EC-5B5D-4375-9989-402430F1A8DE}">
-      <dgm:prSet/>
-      <dgm:spPr/>
-      <dgm:t>
-        <a:bodyPr/>
-        <a:lstStyle/>
-        <a:p>
-          <a:endParaRPr lang="de-DE"/>
-        </a:p>
-      </dgm:t>
-    </dgm:pt>
-    <dgm:pt modelId="{1D955D5B-7B30-4BA9-A9A2-98B7FD491E83}" type="sibTrans" cxnId="{9BD2E0EC-5B5D-4375-9989-402430F1A8DE}">
-      <dgm:prSet/>
-      <dgm:spPr/>
-      <dgm:t>
-        <a:bodyPr/>
-        <a:lstStyle/>
-        <a:p>
-          <a:endParaRPr lang="de-DE"/>
-        </a:p>
-      </dgm:t>
-    </dgm:pt>
-    <dgm:pt modelId="{68D82425-9852-4F68-B54C-85805ED66BE1}">
-      <dgm:prSet phldrT="[Text]"/>
-      <dgm:spPr>
-        <a:solidFill>
-          <a:srgbClr val="A12D0D"/>
-        </a:solidFill>
-      </dgm:spPr>
-      <dgm:t>
-        <a:bodyPr/>
-        <a:lstStyle/>
-        <a:p>
-          <a:r>
-            <a:rPr lang="de-DE" smtClean="0"/>
-            <a:t>9 – 19 Uhr</a:t>
-          </a:r>
-          <a:br>
-            <a:rPr lang="de-DE" smtClean="0"/>
-          </a:br>
-          <a:r>
-            <a:rPr lang="de-DE" smtClean="0"/>
-            <a:t>Open </a:t>
-          </a:r>
-          <a:r>
-            <a:rPr lang="de-DE" err="1" smtClean="0"/>
-            <a:t>Spaces</a:t>
-          </a:r>
-          <a:endParaRPr lang="de-DE"/>
-        </a:p>
-      </dgm:t>
-    </dgm:pt>
-    <dgm:pt modelId="{969570D0-428E-4654-9CFD-04A760CE5848}" type="parTrans" cxnId="{37F09132-B638-41A4-93A0-33CC37B0F082}">
-      <dgm:prSet/>
-      <dgm:spPr/>
-      <dgm:t>
-        <a:bodyPr/>
-        <a:lstStyle/>
-        <a:p>
-          <a:endParaRPr lang="de-DE"/>
-        </a:p>
-      </dgm:t>
-    </dgm:pt>
-    <dgm:pt modelId="{4E77B1EC-CC8F-4469-896A-3DF6F764B8B3}" type="sibTrans" cxnId="{37F09132-B638-41A4-93A0-33CC37B0F082}">
-      <dgm:prSet/>
-      <dgm:spPr/>
-      <dgm:t>
-        <a:bodyPr/>
-        <a:lstStyle/>
-        <a:p>
-          <a:endParaRPr lang="de-DE"/>
-        </a:p>
-      </dgm:t>
-    </dgm:pt>
-    <dgm:pt modelId="{CBB4AAEA-6945-4B7A-853B-45EAE2FC7928}">
-      <dgm:prSet phldrT="[Text]"/>
-      <dgm:spPr>
-        <a:solidFill>
-          <a:srgbClr val="A12D0D"/>
-        </a:solidFill>
-      </dgm:spPr>
-      <dgm:t>
-        <a:bodyPr/>
-        <a:lstStyle/>
-        <a:p>
-          <a:r>
-            <a:rPr lang="de-DE" smtClean="0"/>
-            <a:t>20 Uhr</a:t>
-          </a:r>
-          <a:br>
-            <a:rPr lang="de-DE" smtClean="0"/>
-          </a:br>
-          <a:r>
-            <a:rPr lang="de-DE" smtClean="0"/>
-            <a:t>Party</a:t>
-          </a:r>
-          <a:endParaRPr lang="de-DE"/>
-        </a:p>
-      </dgm:t>
-    </dgm:pt>
-    <dgm:pt modelId="{A4CF9BF0-DC2C-4101-B10B-817E6BD7AF35}" type="parTrans" cxnId="{FC534336-F1E1-42ED-862C-2ACE7909732F}">
-      <dgm:prSet/>
-      <dgm:spPr/>
-      <dgm:t>
-        <a:bodyPr/>
-        <a:lstStyle/>
-        <a:p>
-          <a:endParaRPr lang="de-DE"/>
-        </a:p>
-      </dgm:t>
-    </dgm:pt>
-    <dgm:pt modelId="{A6E04AF2-2B25-4125-B635-533A97CCF887}" type="sibTrans" cxnId="{FC534336-F1E1-42ED-862C-2ACE7909732F}">
-      <dgm:prSet/>
-      <dgm:spPr/>
-      <dgm:t>
-        <a:bodyPr/>
-        <a:lstStyle/>
-        <a:p>
-          <a:endParaRPr lang="de-DE"/>
-        </a:p>
-      </dgm:t>
-    </dgm:pt>
-    <dgm:pt modelId="{EBDBBDD9-E8CD-4891-A7C5-AFB462A5105D}">
-      <dgm:prSet phldrT="[Text]" custT="1"/>
-      <dgm:spPr>
-        <a:solidFill>
-          <a:srgbClr val="E1DF9E"/>
-        </a:solidFill>
-      </dgm:spPr>
-      <dgm:t>
-        <a:bodyPr/>
-        <a:lstStyle/>
-        <a:p>
-          <a:r>
-            <a:rPr lang="de-DE" sz="1800" smtClean="0"/>
-            <a:t>Sonntag, </a:t>
-          </a:r>
-          <a:r>
-            <a:rPr lang="de-DE" sz="1800" smtClean="0"/>
-            <a:t>18.10.09</a:t>
-          </a:r>
-          <a:endParaRPr lang="de-DE" sz="1800"/>
-        </a:p>
-      </dgm:t>
-    </dgm:pt>
-    <dgm:pt modelId="{C96B452C-89C5-49B1-9E14-425649B7BB19}" type="parTrans" cxnId="{71A5DB8C-3FBA-4224-8D9E-120078F27163}">
-      <dgm:prSet/>
-      <dgm:spPr/>
-      <dgm:t>
-        <a:bodyPr/>
-        <a:lstStyle/>
-        <a:p>
-          <a:endParaRPr lang="de-DE"/>
-        </a:p>
-      </dgm:t>
-    </dgm:pt>
-    <dgm:pt modelId="{1982359C-F519-4381-B8C4-D632F5CCE6F1}" type="sibTrans" cxnId="{71A5DB8C-3FBA-4224-8D9E-120078F27163}">
-      <dgm:prSet/>
-      <dgm:spPr/>
-      <dgm:t>
-        <a:bodyPr/>
-        <a:lstStyle/>
-        <a:p>
-          <a:endParaRPr lang="de-DE"/>
-        </a:p>
-      </dgm:t>
-    </dgm:pt>
-    <dgm:pt modelId="{B8D10FDE-6E32-4F84-B637-86F1E1DA8F83}">
-      <dgm:prSet phldrT="[Text]"/>
-      <dgm:spPr>
-        <a:solidFill>
-          <a:srgbClr val="A12D0D"/>
-        </a:solidFill>
-      </dgm:spPr>
-      <dgm:t>
-        <a:bodyPr/>
-        <a:lstStyle/>
-        <a:p>
-          <a:r>
-            <a:rPr lang="de-DE" smtClean="0"/>
-            <a:t>8 Uhr</a:t>
-          </a:r>
-          <a:br>
-            <a:rPr lang="de-DE" smtClean="0"/>
-          </a:br>
-          <a:r>
-            <a:rPr lang="de-DE" smtClean="0"/>
-            <a:t>Smalltalk</a:t>
-          </a:r>
-          <a:endParaRPr lang="de-DE"/>
-        </a:p>
-      </dgm:t>
-    </dgm:pt>
     <dgm:pt modelId="{1712A861-5C83-4E19-804E-8BEDC9A8A465}" type="parTrans" cxnId="{EF990CA9-D5EF-4EB9-B1B7-320943401B95}">
       <dgm:prSet/>
       <dgm:spPr/>
@@ -5288,17 +5276,29 @@
         <a:lstStyle/>
         <a:p>
           <a:r>
-            <a:rPr lang="de-DE" smtClean="0"/>
-            <a:t>9 – 19 Uhr</a:t>
+            <a:rPr lang="de-DE" dirty="0" smtClean="0"/>
+            <a:t>10 </a:t>
+          </a:r>
+          <a:r>
+            <a:rPr lang="de-DE" dirty="0" smtClean="0"/>
+            <a:t>– </a:t>
+          </a:r>
+          <a:r>
+            <a:rPr lang="de-DE" dirty="0" smtClean="0"/>
+            <a:t>18 </a:t>
+          </a:r>
+          <a:r>
+            <a:rPr lang="de-DE" dirty="0" smtClean="0"/>
+            <a:t>Uhr</a:t>
           </a:r>
           <a:br>
-            <a:rPr lang="de-DE" smtClean="0"/>
+            <a:rPr lang="de-DE" dirty="0" smtClean="0"/>
           </a:br>
           <a:r>
-            <a:rPr lang="de-DE" smtClean="0"/>
+            <a:rPr lang="de-DE" dirty="0" smtClean="0"/>
             <a:t>Open Spaces</a:t>
           </a:r>
-          <a:endParaRPr lang="de-DE"/>
+          <a:endParaRPr lang="de-DE" dirty="0"/>
         </a:p>
       </dgm:t>
     </dgm:pt>
@@ -5844,38 +5844,38 @@
     </dgm:pt>
   </dgm:ptLst>
   <dgm:cxnLst>
-    <dgm:cxn modelId="{9BD2E0EC-5B5D-4375-9989-402430F1A8DE}" srcId="{B962C1BA-B9FA-4D7A-8BD3-A3AF853AAF72}" destId="{2106692C-4A97-4081-B6B6-88556F2D42AC}" srcOrd="1" destOrd="0" parTransId="{89E54B7C-510B-4279-90DE-25D9A647AFB7}" sibTransId="{1D955D5B-7B30-4BA9-A9A2-98B7FD491E83}"/>
+    <dgm:cxn modelId="{E5D456DB-D455-4D04-BB1D-46B9CF03BB9A}" type="presOf" srcId="{EBDBBDD9-E8CD-4891-A7C5-AFB462A5105D}" destId="{2938B3CD-317A-4E0F-8618-33F31DD14467}" srcOrd="1" destOrd="0" presId="urn:microsoft.com/office/officeart/2005/8/layout/lProcess2"/>
+    <dgm:cxn modelId="{97E5B9D9-20EB-4E01-91B3-2249C925C1A5}" srcId="{B962C1BA-B9FA-4D7A-8BD3-A3AF853AAF72}" destId="{4853100B-765F-43FD-A797-D82F9734E6DB}" srcOrd="0" destOrd="0" parTransId="{F73DB169-BE08-4DEC-9E1D-4EB943C2E3AC}" sibTransId="{959601D2-24A1-41F9-B4E4-823880B55B50}"/>
+    <dgm:cxn modelId="{1181100C-0363-4E04-A0FE-1391CF41770A}" srcId="{EBDBBDD9-E8CD-4891-A7C5-AFB462A5105D}" destId="{8CA5FB09-1BC0-4568-AF88-9FC0CB1ADBB1}" srcOrd="2" destOrd="0" parTransId="{84E6CC53-F06C-40FD-BDFC-9223716D5D62}" sibTransId="{3A6EC4B4-529A-4486-A01E-8AED5657F643}"/>
+    <dgm:cxn modelId="{6B165CF6-C315-45A6-A724-CE368B104CE0}" type="presOf" srcId="{8CA5FB09-1BC0-4568-AF88-9FC0CB1ADBB1}" destId="{562C62FE-E524-4854-AA9A-CEDFDE8E5818}" srcOrd="0" destOrd="0" presId="urn:microsoft.com/office/officeart/2005/8/layout/lProcess2"/>
+    <dgm:cxn modelId="{0E137871-1E61-471E-9814-822C8D0FAA8E}" type="presOf" srcId="{37FB0BB7-1C36-4C78-BDC4-9B15D0A2EFBA}" destId="{A45E7697-8C47-40D7-9784-E1C13A9358F6}" srcOrd="0" destOrd="0" presId="urn:microsoft.com/office/officeart/2005/8/layout/lProcess2"/>
+    <dgm:cxn modelId="{577FED47-9D79-4759-A769-B44548F118BC}" type="presOf" srcId="{EBDBBDD9-E8CD-4891-A7C5-AFB462A5105D}" destId="{C49EA062-A2A5-4158-904E-5945C6086208}" srcOrd="0" destOrd="0" presId="urn:microsoft.com/office/officeart/2005/8/layout/lProcess2"/>
+    <dgm:cxn modelId="{680D8C80-2D2B-43C5-B3AE-45CFB3D82F60}" type="presOf" srcId="{979D7A78-5B4B-402E-B7CB-577E7A197AC0}" destId="{8AC9234D-F90F-4EF4-8B6C-3FC06301402C}" srcOrd="1" destOrd="0" presId="urn:microsoft.com/office/officeart/2005/8/layout/lProcess2"/>
+    <dgm:cxn modelId="{71D3F576-59BD-4F79-95F1-59969DD24198}" type="presOf" srcId="{B962C1BA-B9FA-4D7A-8BD3-A3AF853AAF72}" destId="{5324F7ED-3B45-4070-BCF1-63E4FAA33219}" srcOrd="0" destOrd="0" presId="urn:microsoft.com/office/officeart/2005/8/layout/lProcess2"/>
     <dgm:cxn modelId="{C3C8A726-4B48-4765-B3F1-7084BCD9A5DC}" srcId="{979D7A78-5B4B-402E-B7CB-577E7A197AC0}" destId="{D5683C4F-9689-4346-B076-5E141EECBCDC}" srcOrd="1" destOrd="0" parTransId="{634856C5-2C87-45D6-B0B6-C8D68CFC9115}" sibTransId="{8713C77F-439A-4281-9F8D-49AEABE75E2B}"/>
     <dgm:cxn modelId="{A728F068-CD01-4215-A053-D863DF18F899}" type="presOf" srcId="{2106692C-4A97-4081-B6B6-88556F2D42AC}" destId="{07143B47-B337-4D7B-956E-8A5174C66416}" srcOrd="0" destOrd="0" presId="urn:microsoft.com/office/officeart/2005/8/layout/lProcess2"/>
+    <dgm:cxn modelId="{E4068459-2FF3-44FE-91C7-02747EF6B10C}" type="presOf" srcId="{6001718C-9C1B-470E-9FB1-28AB95411BF1}" destId="{030D32BF-45BF-4294-95FA-B8580E3067B0}" srcOrd="0" destOrd="0" presId="urn:microsoft.com/office/officeart/2005/8/layout/lProcess2"/>
+    <dgm:cxn modelId="{8732C6C2-98AF-4864-BFC2-6FEFFBF413CD}" type="presOf" srcId="{FF38BA70-2998-48BD-B261-A70B461089F6}" destId="{BF1F9459-AD9E-4534-B439-62A38B84A59C}" srcOrd="0" destOrd="0" presId="urn:microsoft.com/office/officeart/2005/8/layout/lProcess2"/>
     <dgm:cxn modelId="{3544FF2D-457E-43CF-A326-1A35972B46AF}" srcId="{EBDBBDD9-E8CD-4891-A7C5-AFB462A5105D}" destId="{0533D289-E72C-4D0C-905D-E556CDF5C9DE}" srcOrd="3" destOrd="0" parTransId="{E9930BAD-DA04-41FF-8299-35AC0E7D32A1}" sibTransId="{B198938D-8425-46EB-955D-F6C9123A365F}"/>
+    <dgm:cxn modelId="{E4BDD726-C0CC-47AA-B120-CAF934A5EBBE}" srcId="{FF38BA70-2998-48BD-B261-A70B461089F6}" destId="{979D7A78-5B4B-402E-B7CB-577E7A197AC0}" srcOrd="0" destOrd="0" parTransId="{8909C87A-603E-40DE-9566-FE7552C94F31}" sibTransId="{6E251B42-34A3-4ACD-81E1-7118E089143B}"/>
     <dgm:cxn modelId="{4F891C26-9534-4364-B4FC-816162F19ED2}" type="presOf" srcId="{B962C1BA-B9FA-4D7A-8BD3-A3AF853AAF72}" destId="{D6EB44A8-3624-4328-9EFE-FCF73899A0E5}" srcOrd="1" destOrd="0" presId="urn:microsoft.com/office/officeart/2005/8/layout/lProcess2"/>
-    <dgm:cxn modelId="{7614E538-E6B1-4227-AA79-42C2C8FA6D32}" type="presOf" srcId="{E75ACEDB-5C55-4725-B519-EDABBEF8255B}" destId="{10EE4289-6B83-429C-AB6C-E3932732733F}" srcOrd="0" destOrd="0" presId="urn:microsoft.com/office/officeart/2005/8/layout/lProcess2"/>
-    <dgm:cxn modelId="{680D8C80-2D2B-43C5-B3AE-45CFB3D82F60}" type="presOf" srcId="{979D7A78-5B4B-402E-B7CB-577E7A197AC0}" destId="{8AC9234D-F90F-4EF4-8B6C-3FC06301402C}" srcOrd="1" destOrd="0" presId="urn:microsoft.com/office/officeart/2005/8/layout/lProcess2"/>
-    <dgm:cxn modelId="{4EC44CAE-F844-4E0E-880D-C2C1404CB76A}" type="presOf" srcId="{4853100B-765F-43FD-A797-D82F9734E6DB}" destId="{6FE95075-6AF8-4D43-B239-929DA2F254D0}" srcOrd="0" destOrd="0" presId="urn:microsoft.com/office/officeart/2005/8/layout/lProcess2"/>
-    <dgm:cxn modelId="{71A5DB8C-3FBA-4224-8D9E-120078F27163}" srcId="{FF38BA70-2998-48BD-B261-A70B461089F6}" destId="{EBDBBDD9-E8CD-4891-A7C5-AFB462A5105D}" srcOrd="2" destOrd="0" parTransId="{C96B452C-89C5-49B1-9E14-425649B7BB19}" sibTransId="{1982359C-F519-4381-B8C4-D632F5CCE6F1}"/>
     <dgm:cxn modelId="{060F8686-A753-45A1-86A0-F10791758A56}" srcId="{EBDBBDD9-E8CD-4891-A7C5-AFB462A5105D}" destId="{6001718C-9C1B-470E-9FB1-28AB95411BF1}" srcOrd="0" destOrd="0" parTransId="{5013F549-3F3C-4817-80A2-C4C5A1965CD5}" sibTransId="{26185079-76EA-461B-B535-177F62E256C3}"/>
-    <dgm:cxn modelId="{FC534336-F1E1-42ED-862C-2ACE7909732F}" srcId="{B962C1BA-B9FA-4D7A-8BD3-A3AF853AAF72}" destId="{CBB4AAEA-6945-4B7A-853B-45EAE2FC7928}" srcOrd="3" destOrd="0" parTransId="{A4CF9BF0-DC2C-4101-B10B-817E6BD7AF35}" sibTransId="{A6E04AF2-2B25-4125-B635-533A97CCF887}"/>
-    <dgm:cxn modelId="{E4BDD726-C0CC-47AA-B120-CAF934A5EBBE}" srcId="{FF38BA70-2998-48BD-B261-A70B461089F6}" destId="{979D7A78-5B4B-402E-B7CB-577E7A197AC0}" srcOrd="0" destOrd="0" parTransId="{8909C87A-603E-40DE-9566-FE7552C94F31}" sibTransId="{6E251B42-34A3-4ACD-81E1-7118E089143B}"/>
-    <dgm:cxn modelId="{1181100C-0363-4E04-A0FE-1391CF41770A}" srcId="{EBDBBDD9-E8CD-4891-A7C5-AFB462A5105D}" destId="{8CA5FB09-1BC0-4568-AF88-9FC0CB1ADBB1}" srcOrd="2" destOrd="0" parTransId="{84E6CC53-F06C-40FD-BDFC-9223716D5D62}" sibTransId="{3A6EC4B4-529A-4486-A01E-8AED5657F643}"/>
+    <dgm:cxn modelId="{7FD67D25-A460-4AC5-BBDF-13309A2E7E35}" type="presOf" srcId="{D5683C4F-9689-4346-B076-5E141EECBCDC}" destId="{5D8121ED-D8FD-49F9-B686-535A2310F5D6}" srcOrd="0" destOrd="0" presId="urn:microsoft.com/office/officeart/2005/8/layout/lProcess2"/>
     <dgm:cxn modelId="{37F09132-B638-41A4-93A0-33CC37B0F082}" srcId="{B962C1BA-B9FA-4D7A-8BD3-A3AF853AAF72}" destId="{68D82425-9852-4F68-B54C-85805ED66BE1}" srcOrd="2" destOrd="0" parTransId="{969570D0-428E-4654-9CFD-04A760CE5848}" sibTransId="{4E77B1EC-CC8F-4469-896A-3DF6F764B8B3}"/>
     <dgm:cxn modelId="{5873C298-DD16-4C37-A639-3FA8A0BC83BD}" srcId="{FF38BA70-2998-48BD-B261-A70B461089F6}" destId="{B962C1BA-B9FA-4D7A-8BD3-A3AF853AAF72}" srcOrd="1" destOrd="0" parTransId="{C40326C5-DD2C-4AA0-B8FA-32B998545FA0}" sibTransId="{F5FCA406-B798-4646-A7B9-B57F2DF147EE}"/>
-    <dgm:cxn modelId="{71D3F576-59BD-4F79-95F1-59969DD24198}" type="presOf" srcId="{B962C1BA-B9FA-4D7A-8BD3-A3AF853AAF72}" destId="{5324F7ED-3B45-4070-BCF1-63E4FAA33219}" srcOrd="0" destOrd="0" presId="urn:microsoft.com/office/officeart/2005/8/layout/lProcess2"/>
-    <dgm:cxn modelId="{E5D456DB-D455-4D04-BB1D-46B9CF03BB9A}" type="presOf" srcId="{EBDBBDD9-E8CD-4891-A7C5-AFB462A5105D}" destId="{2938B3CD-317A-4E0F-8618-33F31DD14467}" srcOrd="1" destOrd="0" presId="urn:microsoft.com/office/officeart/2005/8/layout/lProcess2"/>
-    <dgm:cxn modelId="{0E137871-1E61-471E-9814-822C8D0FAA8E}" type="presOf" srcId="{37FB0BB7-1C36-4C78-BDC4-9B15D0A2EFBA}" destId="{A45E7697-8C47-40D7-9784-E1C13A9358F6}" srcOrd="0" destOrd="0" presId="urn:microsoft.com/office/officeart/2005/8/layout/lProcess2"/>
-    <dgm:cxn modelId="{8732C6C2-98AF-4864-BFC2-6FEFFBF413CD}" type="presOf" srcId="{FF38BA70-2998-48BD-B261-A70B461089F6}" destId="{BF1F9459-AD9E-4534-B439-62A38B84A59C}" srcOrd="0" destOrd="0" presId="urn:microsoft.com/office/officeart/2005/8/layout/lProcess2"/>
-    <dgm:cxn modelId="{432B42AB-0C84-471C-9986-CED7D04E7E60}" type="presOf" srcId="{B8D10FDE-6E32-4F84-B637-86F1E1DA8F83}" destId="{6A6EFDF1-527A-4470-8A8C-D4C0F52C28A7}" srcOrd="0" destOrd="0" presId="urn:microsoft.com/office/officeart/2005/8/layout/lProcess2"/>
-    <dgm:cxn modelId="{62C52953-9987-4698-BDD6-91187D1907BB}" type="presOf" srcId="{CBB4AAEA-6945-4B7A-853B-45EAE2FC7928}" destId="{4BDE38F7-DA67-42D3-8710-F7C774BDD06B}" srcOrd="0" destOrd="0" presId="urn:microsoft.com/office/officeart/2005/8/layout/lProcess2"/>
-    <dgm:cxn modelId="{35DF36AA-07D8-4BAD-82C7-C11569342897}" srcId="{979D7A78-5B4B-402E-B7CB-577E7A197AC0}" destId="{E75ACEDB-5C55-4725-B519-EDABBEF8255B}" srcOrd="2" destOrd="0" parTransId="{888BB770-DF07-4F6D-8DD4-8CC5CFF8E8F8}" sibTransId="{FE71FE87-243A-4931-B03D-2521D8EFDC74}"/>
-    <dgm:cxn modelId="{5CBDCD59-843D-483C-8A5C-1A27ADB3EB5D}" srcId="{979D7A78-5B4B-402E-B7CB-577E7A197AC0}" destId="{37FB0BB7-1C36-4C78-BDC4-9B15D0A2EFBA}" srcOrd="0" destOrd="0" parTransId="{A33BCA85-AAE2-49B6-8363-DADFDB42EFA1}" sibTransId="{2821F068-F0AC-49B7-9D64-F312ECB5E19D}"/>
+    <dgm:cxn modelId="{7614E538-E6B1-4227-AA79-42C2C8FA6D32}" type="presOf" srcId="{E75ACEDB-5C55-4725-B519-EDABBEF8255B}" destId="{10EE4289-6B83-429C-AB6C-E3932732733F}" srcOrd="0" destOrd="0" presId="urn:microsoft.com/office/officeart/2005/8/layout/lProcess2"/>
     <dgm:cxn modelId="{645C0634-6952-4BC8-80CE-32439A8F54EE}" type="presOf" srcId="{979D7A78-5B4B-402E-B7CB-577E7A197AC0}" destId="{3D2B067F-8218-496A-ABBE-A56032863788}" srcOrd="0" destOrd="0" presId="urn:microsoft.com/office/officeart/2005/8/layout/lProcess2"/>
-    <dgm:cxn modelId="{6B165CF6-C315-45A6-A724-CE368B104CE0}" type="presOf" srcId="{8CA5FB09-1BC0-4568-AF88-9FC0CB1ADBB1}" destId="{562C62FE-E524-4854-AA9A-CEDFDE8E5818}" srcOrd="0" destOrd="0" presId="urn:microsoft.com/office/officeart/2005/8/layout/lProcess2"/>
-    <dgm:cxn modelId="{EF990CA9-D5EF-4EB9-B1B7-320943401B95}" srcId="{EBDBBDD9-E8CD-4891-A7C5-AFB462A5105D}" destId="{B8D10FDE-6E32-4F84-B637-86F1E1DA8F83}" srcOrd="1" destOrd="0" parTransId="{1712A861-5C83-4E19-804E-8BEDC9A8A465}" sibTransId="{812E89B7-AED1-4F73-8097-8FB4B08650FC}"/>
-    <dgm:cxn modelId="{577FED47-9D79-4759-A769-B44548F118BC}" type="presOf" srcId="{EBDBBDD9-E8CD-4891-A7C5-AFB462A5105D}" destId="{C49EA062-A2A5-4158-904E-5945C6086208}" srcOrd="0" destOrd="0" presId="urn:microsoft.com/office/officeart/2005/8/layout/lProcess2"/>
-    <dgm:cxn modelId="{E4068459-2FF3-44FE-91C7-02747EF6B10C}" type="presOf" srcId="{6001718C-9C1B-470E-9FB1-28AB95411BF1}" destId="{030D32BF-45BF-4294-95FA-B8580E3067B0}" srcOrd="0" destOrd="0" presId="urn:microsoft.com/office/officeart/2005/8/layout/lProcess2"/>
+    <dgm:cxn modelId="{FC534336-F1E1-42ED-862C-2ACE7909732F}" srcId="{B962C1BA-B9FA-4D7A-8BD3-A3AF853AAF72}" destId="{CBB4AAEA-6945-4B7A-853B-45EAE2FC7928}" srcOrd="3" destOrd="0" parTransId="{A4CF9BF0-DC2C-4101-B10B-817E6BD7AF35}" sibTransId="{A6E04AF2-2B25-4125-B635-533A97CCF887}"/>
+    <dgm:cxn modelId="{4EC44CAE-F844-4E0E-880D-C2C1404CB76A}" type="presOf" srcId="{4853100B-765F-43FD-A797-D82F9734E6DB}" destId="{6FE95075-6AF8-4D43-B239-929DA2F254D0}" srcOrd="0" destOrd="0" presId="urn:microsoft.com/office/officeart/2005/8/layout/lProcess2"/>
     <dgm:cxn modelId="{465E3B7D-35F5-455D-AA0E-AE26F4C0B1F4}" type="presOf" srcId="{68D82425-9852-4F68-B54C-85805ED66BE1}" destId="{9B0F7344-B2D3-4F1F-B219-D92C92A21897}" srcOrd="0" destOrd="0" presId="urn:microsoft.com/office/officeart/2005/8/layout/lProcess2"/>
     <dgm:cxn modelId="{816D117E-A6CE-4A58-B7A7-43B9C4419F62}" type="presOf" srcId="{0533D289-E72C-4D0C-905D-E556CDF5C9DE}" destId="{75473608-B74A-4E5F-B24F-6601E0D58C72}" srcOrd="0" destOrd="0" presId="urn:microsoft.com/office/officeart/2005/8/layout/lProcess2"/>
-    <dgm:cxn modelId="{7FD67D25-A460-4AC5-BBDF-13309A2E7E35}" type="presOf" srcId="{D5683C4F-9689-4346-B076-5E141EECBCDC}" destId="{5D8121ED-D8FD-49F9-B686-535A2310F5D6}" srcOrd="0" destOrd="0" presId="urn:microsoft.com/office/officeart/2005/8/layout/lProcess2"/>
-    <dgm:cxn modelId="{97E5B9D9-20EB-4E01-91B3-2249C925C1A5}" srcId="{B962C1BA-B9FA-4D7A-8BD3-A3AF853AAF72}" destId="{4853100B-765F-43FD-A797-D82F9734E6DB}" srcOrd="0" destOrd="0" parTransId="{F73DB169-BE08-4DEC-9E1D-4EB943C2E3AC}" sibTransId="{959601D2-24A1-41F9-B4E4-823880B55B50}"/>
+    <dgm:cxn modelId="{62C52953-9987-4698-BDD6-91187D1907BB}" type="presOf" srcId="{CBB4AAEA-6945-4B7A-853B-45EAE2FC7928}" destId="{4BDE38F7-DA67-42D3-8710-F7C774BDD06B}" srcOrd="0" destOrd="0" presId="urn:microsoft.com/office/officeart/2005/8/layout/lProcess2"/>
+    <dgm:cxn modelId="{EF990CA9-D5EF-4EB9-B1B7-320943401B95}" srcId="{EBDBBDD9-E8CD-4891-A7C5-AFB462A5105D}" destId="{B8D10FDE-6E32-4F84-B637-86F1E1DA8F83}" srcOrd="1" destOrd="0" parTransId="{1712A861-5C83-4E19-804E-8BEDC9A8A465}" sibTransId="{812E89B7-AED1-4F73-8097-8FB4B08650FC}"/>
+    <dgm:cxn modelId="{71A5DB8C-3FBA-4224-8D9E-120078F27163}" srcId="{FF38BA70-2998-48BD-B261-A70B461089F6}" destId="{EBDBBDD9-E8CD-4891-A7C5-AFB462A5105D}" srcOrd="2" destOrd="0" parTransId="{C96B452C-89C5-49B1-9E14-425649B7BB19}" sibTransId="{1982359C-F519-4381-B8C4-D632F5CCE6F1}"/>
+    <dgm:cxn modelId="{9BD2E0EC-5B5D-4375-9989-402430F1A8DE}" srcId="{B962C1BA-B9FA-4D7A-8BD3-A3AF853AAF72}" destId="{2106692C-4A97-4081-B6B6-88556F2D42AC}" srcOrd="1" destOrd="0" parTransId="{89E54B7C-510B-4279-90DE-25D9A647AFB7}" sibTransId="{1D955D5B-7B30-4BA9-A9A2-98B7FD491E83}"/>
+    <dgm:cxn modelId="{35DF36AA-07D8-4BAD-82C7-C11569342897}" srcId="{979D7A78-5B4B-402E-B7CB-577E7A197AC0}" destId="{E75ACEDB-5C55-4725-B519-EDABBEF8255B}" srcOrd="2" destOrd="0" parTransId="{888BB770-DF07-4F6D-8DD4-8CC5CFF8E8F8}" sibTransId="{FE71FE87-243A-4931-B03D-2521D8EFDC74}"/>
+    <dgm:cxn modelId="{432B42AB-0C84-471C-9986-CED7D04E7E60}" type="presOf" srcId="{B8D10FDE-6E32-4F84-B637-86F1E1DA8F83}" destId="{6A6EFDF1-527A-4470-8A8C-D4C0F52C28A7}" srcOrd="0" destOrd="0" presId="urn:microsoft.com/office/officeart/2005/8/layout/lProcess2"/>
+    <dgm:cxn modelId="{5CBDCD59-843D-483C-8A5C-1A27ADB3EB5D}" srcId="{979D7A78-5B4B-402E-B7CB-577E7A197AC0}" destId="{37FB0BB7-1C36-4C78-BDC4-9B15D0A2EFBA}" srcOrd="0" destOrd="0" parTransId="{A33BCA85-AAE2-49B6-8363-DADFDB42EFA1}" sibTransId="{2821F068-F0AC-49B7-9D64-F312ECB5E19D}"/>
     <dgm:cxn modelId="{6181B8E8-4ACE-4918-9696-B389C3A27C0A}" type="presParOf" srcId="{BF1F9459-AD9E-4534-B439-62A38B84A59C}" destId="{37434F99-D17D-4A72-A576-9F27DA12FB3A}" srcOrd="0" destOrd="0" presId="urn:microsoft.com/office/officeart/2005/8/layout/lProcess2"/>
     <dgm:cxn modelId="{4812251D-6530-4486-B129-8636EE088308}" type="presParOf" srcId="{37434F99-D17D-4A72-A576-9F27DA12FB3A}" destId="{3D2B067F-8218-496A-ABBE-A56032863788}" srcOrd="0" destOrd="0" presId="urn:microsoft.com/office/officeart/2005/8/layout/lProcess2"/>
     <dgm:cxn modelId="{7A2B6306-39D5-403C-9DDF-0B4F23738B7E}" type="presParOf" srcId="{37434F99-D17D-4A72-A576-9F27DA12FB3A}" destId="{8AC9234D-F90F-4EF4-8B6C-3FC06301402C}" srcOrd="1" destOrd="0" presId="urn:microsoft.com/office/officeart/2005/8/layout/lProcess2"/>
@@ -5917,7 +5917,7 @@
   <dgm:whole/>
   <dgm:extLst>
     <a:ext uri="http://schemas.microsoft.com/office/drawing/2008/diagram">
-      <dsp:dataModelExt xmlns:dsp="http://schemas.microsoft.com/office/drawing/2008/diagram" xmlns="" relId="rId6" minVer="http://schemas.openxmlformats.org/drawingml/2006/diagram"/>
+      <dsp:dataModelExt xmlns:dsp="http://schemas.microsoft.com/office/drawing/2008/diagram" relId="rId6" minVer="http://schemas.openxmlformats.org/drawingml/2006/diagram"/>
     </a:ext>
   </dgm:extLst>
 </dgm:dataModel>
@@ -5950,11 +5950,7 @@
         <a:p>
           <a:r>
             <a:rPr lang="de-DE" sz="1800" smtClean="0"/>
-            <a:t>Friday, </a:t>
-          </a:r>
-          <a:r>
-            <a:rPr lang="de-DE" sz="1800" smtClean="0"/>
-            <a:t>10/16/09</a:t>
+            <a:t>Friday, 10/16/09</a:t>
           </a:r>
           <a:endParaRPr lang="de-DE" sz="1800"/>
         </a:p>
@@ -6085,11 +6081,7 @@
         <a:p>
           <a:r>
             <a:rPr lang="de-DE" sz="1800" smtClean="0"/>
-            <a:t>Saturday, </a:t>
-          </a:r>
-          <a:r>
-            <a:rPr lang="de-DE" sz="1800" smtClean="0"/>
-            <a:t>10/17/09</a:t>
+            <a:t>Saturday, 10/17/09</a:t>
           </a:r>
           <a:endParaRPr lang="de-DE" sz="1800"/>
         </a:p>
@@ -6274,11 +6266,7 @@
         <a:p>
           <a:r>
             <a:rPr lang="de-DE" sz="1800" smtClean="0"/>
-            <a:t>Sunday, </a:t>
-          </a:r>
-          <a:r>
-            <a:rPr lang="de-DE" sz="1800" smtClean="0"/>
-            <a:t>10/18/09</a:t>
+            <a:t>Sunday, 10/18/09</a:t>
           </a:r>
           <a:endParaRPr lang="de-DE" sz="1800"/>
         </a:p>
@@ -6894,38 +6882,38 @@
     </dgm:pt>
   </dgm:ptLst>
   <dgm:cxnLst>
+    <dgm:cxn modelId="{3AB56C57-AD90-46AA-976A-F36A61F1DD8C}" type="presOf" srcId="{8CA5FB09-1BC0-4568-AF88-9FC0CB1ADBB1}" destId="{562C62FE-E524-4854-AA9A-CEDFDE8E5818}" srcOrd="0" destOrd="0" presId="urn:microsoft.com/office/officeart/2005/8/layout/lProcess2"/>
+    <dgm:cxn modelId="{E061392B-8E6D-46A3-BED7-182F9A578FCD}" srcId="{EBDBBDD9-E8CD-4891-A7C5-AFB462A5105D}" destId="{B2DFC4E7-C413-437B-A4C7-08E9A02414C1}" srcOrd="0" destOrd="0" parTransId="{F7420A7C-37FD-40D4-8F77-12E081B59003}" sibTransId="{2C07676D-C3F3-4208-A68E-912B5DE1B80E}"/>
+    <dgm:cxn modelId="{97FCB098-5234-4316-A486-4095415E0232}" type="presOf" srcId="{E75ACEDB-5C55-4725-B519-EDABBEF8255B}" destId="{10EE4289-6B83-429C-AB6C-E3932732733F}" srcOrd="0" destOrd="0" presId="urn:microsoft.com/office/officeart/2005/8/layout/lProcess2"/>
+    <dgm:cxn modelId="{1181100C-0363-4E04-A0FE-1391CF41770A}" srcId="{EBDBBDD9-E8CD-4891-A7C5-AFB462A5105D}" destId="{8CA5FB09-1BC0-4568-AF88-9FC0CB1ADBB1}" srcOrd="2" destOrd="0" parTransId="{84E6CC53-F06C-40FD-BDFC-9223716D5D62}" sibTransId="{3A6EC4B4-529A-4486-A01E-8AED5657F643}"/>
+    <dgm:cxn modelId="{E97DE9DE-2EE6-4525-A9C5-68952A3F8473}" type="presOf" srcId="{B8D10FDE-6E32-4F84-B637-86F1E1DA8F83}" destId="{6A6EFDF1-527A-4470-8A8C-D4C0F52C28A7}" srcOrd="0" destOrd="0" presId="urn:microsoft.com/office/officeart/2005/8/layout/lProcess2"/>
+    <dgm:cxn modelId="{547D31AE-B7C4-4871-A29D-52BDF62CF5E9}" type="presOf" srcId="{B962C1BA-B9FA-4D7A-8BD3-A3AF853AAF72}" destId="{5324F7ED-3B45-4070-BCF1-63E4FAA33219}" srcOrd="0" destOrd="0" presId="urn:microsoft.com/office/officeart/2005/8/layout/lProcess2"/>
+    <dgm:cxn modelId="{C336922D-C74F-40E1-BC16-9FEA07E7F49F}" type="presOf" srcId="{2106692C-4A97-4081-B6B6-88556F2D42AC}" destId="{07143B47-B337-4D7B-956E-8A5174C66416}" srcOrd="0" destOrd="0" presId="urn:microsoft.com/office/officeart/2005/8/layout/lProcess2"/>
+    <dgm:cxn modelId="{FF4E19AE-5B3A-47FF-971C-BBD59A9E2997}" srcId="{B962C1BA-B9FA-4D7A-8BD3-A3AF853AAF72}" destId="{A9E0CE7A-9932-41E2-B872-1C9DE3FAB7F3}" srcOrd="0" destOrd="0" parTransId="{175D9796-1002-4187-A20C-CA59BCE1066C}" sibTransId="{50AC68C6-DA8C-4620-9118-23C082BAA9D1}"/>
+    <dgm:cxn modelId="{DFE564D5-5893-4844-BE20-D1D3ABDD1BD7}" type="presOf" srcId="{B962C1BA-B9FA-4D7A-8BD3-A3AF853AAF72}" destId="{D6EB44A8-3624-4328-9EFE-FCF73899A0E5}" srcOrd="1" destOrd="0" presId="urn:microsoft.com/office/officeart/2005/8/layout/lProcess2"/>
+    <dgm:cxn modelId="{C3C8A726-4B48-4765-B3F1-7084BCD9A5DC}" srcId="{979D7A78-5B4B-402E-B7CB-577E7A197AC0}" destId="{D5683C4F-9689-4346-B076-5E141EECBCDC}" srcOrd="1" destOrd="0" parTransId="{634856C5-2C87-45D6-B0B6-C8D68CFC9115}" sibTransId="{8713C77F-439A-4281-9F8D-49AEABE75E2B}"/>
+    <dgm:cxn modelId="{3544FF2D-457E-43CF-A326-1A35972B46AF}" srcId="{EBDBBDD9-E8CD-4891-A7C5-AFB462A5105D}" destId="{0533D289-E72C-4D0C-905D-E556CDF5C9DE}" srcOrd="3" destOrd="0" parTransId="{E9930BAD-DA04-41FF-8299-35AC0E7D32A1}" sibTransId="{B198938D-8425-46EB-955D-F6C9123A365F}"/>
+    <dgm:cxn modelId="{E4BDD726-C0CC-47AA-B120-CAF934A5EBBE}" srcId="{FF38BA70-2998-48BD-B261-A70B461089F6}" destId="{979D7A78-5B4B-402E-B7CB-577E7A197AC0}" srcOrd="0" destOrd="0" parTransId="{8909C87A-603E-40DE-9566-FE7552C94F31}" sibTransId="{6E251B42-34A3-4ACD-81E1-7118E089143B}"/>
+    <dgm:cxn modelId="{1CFD76AE-7A18-4344-9DEF-8B0BEC602612}" type="presOf" srcId="{0533D289-E72C-4D0C-905D-E556CDF5C9DE}" destId="{75473608-B74A-4E5F-B24F-6601E0D58C72}" srcOrd="0" destOrd="0" presId="urn:microsoft.com/office/officeart/2005/8/layout/lProcess2"/>
+    <dgm:cxn modelId="{449545D2-1727-449E-92B9-0522A9C6B8C9}" type="presOf" srcId="{68D82425-9852-4F68-B54C-85805ED66BE1}" destId="{9B0F7344-B2D3-4F1F-B219-D92C92A21897}" srcOrd="0" destOrd="0" presId="urn:microsoft.com/office/officeart/2005/8/layout/lProcess2"/>
+    <dgm:cxn modelId="{70B6F3AF-E7B0-4547-8B53-080C0ADB1FED}" type="presOf" srcId="{B2DFC4E7-C413-437B-A4C7-08E9A02414C1}" destId="{DA2EE31C-2B2A-4EFF-AF93-FDFDBDDEDC20}" srcOrd="0" destOrd="0" presId="urn:microsoft.com/office/officeart/2005/8/layout/lProcess2"/>
+    <dgm:cxn modelId="{61A95A82-DC72-4DFA-BB94-5457839E3AF1}" type="presOf" srcId="{37FB0BB7-1C36-4C78-BDC4-9B15D0A2EFBA}" destId="{A45E7697-8C47-40D7-9784-E1C13A9358F6}" srcOrd="0" destOrd="0" presId="urn:microsoft.com/office/officeart/2005/8/layout/lProcess2"/>
+    <dgm:cxn modelId="{37F09132-B638-41A4-93A0-33CC37B0F082}" srcId="{B962C1BA-B9FA-4D7A-8BD3-A3AF853AAF72}" destId="{68D82425-9852-4F68-B54C-85805ED66BE1}" srcOrd="2" destOrd="0" parTransId="{969570D0-428E-4654-9CFD-04A760CE5848}" sibTransId="{4E77B1EC-CC8F-4469-896A-3DF6F764B8B3}"/>
+    <dgm:cxn modelId="{5873C298-DD16-4C37-A639-3FA8A0BC83BD}" srcId="{FF38BA70-2998-48BD-B261-A70B461089F6}" destId="{B962C1BA-B9FA-4D7A-8BD3-A3AF853AAF72}" srcOrd="1" destOrd="0" parTransId="{C40326C5-DD2C-4AA0-B8FA-32B998545FA0}" sibTransId="{F5FCA406-B798-4646-A7B9-B57F2DF147EE}"/>
+    <dgm:cxn modelId="{37F31979-2130-46DA-B337-115E70261255}" type="presOf" srcId="{CBB4AAEA-6945-4B7A-853B-45EAE2FC7928}" destId="{4BDE38F7-DA67-42D3-8710-F7C774BDD06B}" srcOrd="0" destOrd="0" presId="urn:microsoft.com/office/officeart/2005/8/layout/lProcess2"/>
+    <dgm:cxn modelId="{23C1CA13-450C-4288-BBF5-6033A0F2456B}" type="presOf" srcId="{979D7A78-5B4B-402E-B7CB-577E7A197AC0}" destId="{3D2B067F-8218-496A-ABBE-A56032863788}" srcOrd="0" destOrd="0" presId="urn:microsoft.com/office/officeart/2005/8/layout/lProcess2"/>
+    <dgm:cxn modelId="{880AE643-6AB7-4659-94AE-B07FD324211B}" type="presOf" srcId="{EBDBBDD9-E8CD-4891-A7C5-AFB462A5105D}" destId="{2938B3CD-317A-4E0F-8618-33F31DD14467}" srcOrd="1" destOrd="0" presId="urn:microsoft.com/office/officeart/2005/8/layout/lProcess2"/>
+    <dgm:cxn modelId="{198AD2CF-C56F-45B0-B5B3-86B4573DC943}" type="presOf" srcId="{FF38BA70-2998-48BD-B261-A70B461089F6}" destId="{BF1F9459-AD9E-4534-B439-62A38B84A59C}" srcOrd="0" destOrd="0" presId="urn:microsoft.com/office/officeart/2005/8/layout/lProcess2"/>
+    <dgm:cxn modelId="{FC534336-F1E1-42ED-862C-2ACE7909732F}" srcId="{B962C1BA-B9FA-4D7A-8BD3-A3AF853AAF72}" destId="{CBB4AAEA-6945-4B7A-853B-45EAE2FC7928}" srcOrd="3" destOrd="0" parTransId="{A4CF9BF0-DC2C-4101-B10B-817E6BD7AF35}" sibTransId="{A6E04AF2-2B25-4125-B635-533A97CCF887}"/>
+    <dgm:cxn modelId="{E4353B79-3665-448C-B8F8-317FCDC9E673}" type="presOf" srcId="{EBDBBDD9-E8CD-4891-A7C5-AFB462A5105D}" destId="{C49EA062-A2A5-4158-904E-5945C6086208}" srcOrd="0" destOrd="0" presId="urn:microsoft.com/office/officeart/2005/8/layout/lProcess2"/>
+    <dgm:cxn modelId="{E0948AAD-52F0-4953-ACE3-1E50F47A12E1}" type="presOf" srcId="{979D7A78-5B4B-402E-B7CB-577E7A197AC0}" destId="{8AC9234D-F90F-4EF4-8B6C-3FC06301402C}" srcOrd="1" destOrd="0" presId="urn:microsoft.com/office/officeart/2005/8/layout/lProcess2"/>
+    <dgm:cxn modelId="{EF990CA9-D5EF-4EB9-B1B7-320943401B95}" srcId="{EBDBBDD9-E8CD-4891-A7C5-AFB462A5105D}" destId="{B8D10FDE-6E32-4F84-B637-86F1E1DA8F83}" srcOrd="1" destOrd="0" parTransId="{1712A861-5C83-4E19-804E-8BEDC9A8A465}" sibTransId="{812E89B7-AED1-4F73-8097-8FB4B08650FC}"/>
+    <dgm:cxn modelId="{71A5DB8C-3FBA-4224-8D9E-120078F27163}" srcId="{FF38BA70-2998-48BD-B261-A70B461089F6}" destId="{EBDBBDD9-E8CD-4891-A7C5-AFB462A5105D}" srcOrd="2" destOrd="0" parTransId="{C96B452C-89C5-49B1-9E14-425649B7BB19}" sibTransId="{1982359C-F519-4381-B8C4-D632F5CCE6F1}"/>
+    <dgm:cxn modelId="{9BD2E0EC-5B5D-4375-9989-402430F1A8DE}" srcId="{B962C1BA-B9FA-4D7A-8BD3-A3AF853AAF72}" destId="{2106692C-4A97-4081-B6B6-88556F2D42AC}" srcOrd="1" destOrd="0" parTransId="{89E54B7C-510B-4279-90DE-25D9A647AFB7}" sibTransId="{1D955D5B-7B30-4BA9-A9A2-98B7FD491E83}"/>
     <dgm:cxn modelId="{32F7150A-A5E7-4D26-9351-EB3D2E84B3A0}" type="presOf" srcId="{D5683C4F-9689-4346-B076-5E141EECBCDC}" destId="{5D8121ED-D8FD-49F9-B686-535A2310F5D6}" srcOrd="0" destOrd="0" presId="urn:microsoft.com/office/officeart/2005/8/layout/lProcess2"/>
-    <dgm:cxn modelId="{C3C8A726-4B48-4765-B3F1-7084BCD9A5DC}" srcId="{979D7A78-5B4B-402E-B7CB-577E7A197AC0}" destId="{D5683C4F-9689-4346-B076-5E141EECBCDC}" srcOrd="1" destOrd="0" parTransId="{634856C5-2C87-45D6-B0B6-C8D68CFC9115}" sibTransId="{8713C77F-439A-4281-9F8D-49AEABE75E2B}"/>
-    <dgm:cxn modelId="{9BD2E0EC-5B5D-4375-9989-402430F1A8DE}" srcId="{B962C1BA-B9FA-4D7A-8BD3-A3AF853AAF72}" destId="{2106692C-4A97-4081-B6B6-88556F2D42AC}" srcOrd="1" destOrd="0" parTransId="{89E54B7C-510B-4279-90DE-25D9A647AFB7}" sibTransId="{1D955D5B-7B30-4BA9-A9A2-98B7FD491E83}"/>
-    <dgm:cxn modelId="{97FCB098-5234-4316-A486-4095415E0232}" type="presOf" srcId="{E75ACEDB-5C55-4725-B519-EDABBEF8255B}" destId="{10EE4289-6B83-429C-AB6C-E3932732733F}" srcOrd="0" destOrd="0" presId="urn:microsoft.com/office/officeart/2005/8/layout/lProcess2"/>
-    <dgm:cxn modelId="{449545D2-1727-449E-92B9-0522A9C6B8C9}" type="presOf" srcId="{68D82425-9852-4F68-B54C-85805ED66BE1}" destId="{9B0F7344-B2D3-4F1F-B219-D92C92A21897}" srcOrd="0" destOrd="0" presId="urn:microsoft.com/office/officeart/2005/8/layout/lProcess2"/>
-    <dgm:cxn modelId="{37F31979-2130-46DA-B337-115E70261255}" type="presOf" srcId="{CBB4AAEA-6945-4B7A-853B-45EAE2FC7928}" destId="{4BDE38F7-DA67-42D3-8710-F7C774BDD06B}" srcOrd="0" destOrd="0" presId="urn:microsoft.com/office/officeart/2005/8/layout/lProcess2"/>
-    <dgm:cxn modelId="{3544FF2D-457E-43CF-A326-1A35972B46AF}" srcId="{EBDBBDD9-E8CD-4891-A7C5-AFB462A5105D}" destId="{0533D289-E72C-4D0C-905D-E556CDF5C9DE}" srcOrd="3" destOrd="0" parTransId="{E9930BAD-DA04-41FF-8299-35AC0E7D32A1}" sibTransId="{B198938D-8425-46EB-955D-F6C9123A365F}"/>
-    <dgm:cxn modelId="{198AD2CF-C56F-45B0-B5B3-86B4573DC943}" type="presOf" srcId="{FF38BA70-2998-48BD-B261-A70B461089F6}" destId="{BF1F9459-AD9E-4534-B439-62A38B84A59C}" srcOrd="0" destOrd="0" presId="urn:microsoft.com/office/officeart/2005/8/layout/lProcess2"/>
-    <dgm:cxn modelId="{547D31AE-B7C4-4871-A29D-52BDF62CF5E9}" type="presOf" srcId="{B962C1BA-B9FA-4D7A-8BD3-A3AF853AAF72}" destId="{5324F7ED-3B45-4070-BCF1-63E4FAA33219}" srcOrd="0" destOrd="0" presId="urn:microsoft.com/office/officeart/2005/8/layout/lProcess2"/>
-    <dgm:cxn modelId="{61A95A82-DC72-4DFA-BB94-5457839E3AF1}" type="presOf" srcId="{37FB0BB7-1C36-4C78-BDC4-9B15D0A2EFBA}" destId="{A45E7697-8C47-40D7-9784-E1C13A9358F6}" srcOrd="0" destOrd="0" presId="urn:microsoft.com/office/officeart/2005/8/layout/lProcess2"/>
-    <dgm:cxn modelId="{71A5DB8C-3FBA-4224-8D9E-120078F27163}" srcId="{FF38BA70-2998-48BD-B261-A70B461089F6}" destId="{EBDBBDD9-E8CD-4891-A7C5-AFB462A5105D}" srcOrd="2" destOrd="0" parTransId="{C96B452C-89C5-49B1-9E14-425649B7BB19}" sibTransId="{1982359C-F519-4381-B8C4-D632F5CCE6F1}"/>
-    <dgm:cxn modelId="{FC534336-F1E1-42ED-862C-2ACE7909732F}" srcId="{B962C1BA-B9FA-4D7A-8BD3-A3AF853AAF72}" destId="{CBB4AAEA-6945-4B7A-853B-45EAE2FC7928}" srcOrd="3" destOrd="0" parTransId="{A4CF9BF0-DC2C-4101-B10B-817E6BD7AF35}" sibTransId="{A6E04AF2-2B25-4125-B635-533A97CCF887}"/>
-    <dgm:cxn modelId="{E4BDD726-C0CC-47AA-B120-CAF934A5EBBE}" srcId="{FF38BA70-2998-48BD-B261-A70B461089F6}" destId="{979D7A78-5B4B-402E-B7CB-577E7A197AC0}" srcOrd="0" destOrd="0" parTransId="{8909C87A-603E-40DE-9566-FE7552C94F31}" sibTransId="{6E251B42-34A3-4ACD-81E1-7118E089143B}"/>
-    <dgm:cxn modelId="{FF4E19AE-5B3A-47FF-971C-BBD59A9E2997}" srcId="{B962C1BA-B9FA-4D7A-8BD3-A3AF853AAF72}" destId="{A9E0CE7A-9932-41E2-B872-1C9DE3FAB7F3}" srcOrd="0" destOrd="0" parTransId="{175D9796-1002-4187-A20C-CA59BCE1066C}" sibTransId="{50AC68C6-DA8C-4620-9118-23C082BAA9D1}"/>
-    <dgm:cxn modelId="{1181100C-0363-4E04-A0FE-1391CF41770A}" srcId="{EBDBBDD9-E8CD-4891-A7C5-AFB462A5105D}" destId="{8CA5FB09-1BC0-4568-AF88-9FC0CB1ADBB1}" srcOrd="2" destOrd="0" parTransId="{84E6CC53-F06C-40FD-BDFC-9223716D5D62}" sibTransId="{3A6EC4B4-529A-4486-A01E-8AED5657F643}"/>
-    <dgm:cxn modelId="{37F09132-B638-41A4-93A0-33CC37B0F082}" srcId="{B962C1BA-B9FA-4D7A-8BD3-A3AF853AAF72}" destId="{68D82425-9852-4F68-B54C-85805ED66BE1}" srcOrd="2" destOrd="0" parTransId="{969570D0-428E-4654-9CFD-04A760CE5848}" sibTransId="{4E77B1EC-CC8F-4469-896A-3DF6F764B8B3}"/>
-    <dgm:cxn modelId="{70B6F3AF-E7B0-4547-8B53-080C0ADB1FED}" type="presOf" srcId="{B2DFC4E7-C413-437B-A4C7-08E9A02414C1}" destId="{DA2EE31C-2B2A-4EFF-AF93-FDFDBDDEDC20}" srcOrd="0" destOrd="0" presId="urn:microsoft.com/office/officeart/2005/8/layout/lProcess2"/>
-    <dgm:cxn modelId="{5873C298-DD16-4C37-A639-3FA8A0BC83BD}" srcId="{FF38BA70-2998-48BD-B261-A70B461089F6}" destId="{B962C1BA-B9FA-4D7A-8BD3-A3AF853AAF72}" srcOrd="1" destOrd="0" parTransId="{C40326C5-DD2C-4AA0-B8FA-32B998545FA0}" sibTransId="{F5FCA406-B798-4646-A7B9-B57F2DF147EE}"/>
-    <dgm:cxn modelId="{E4353B79-3665-448C-B8F8-317FCDC9E673}" type="presOf" srcId="{EBDBBDD9-E8CD-4891-A7C5-AFB462A5105D}" destId="{C49EA062-A2A5-4158-904E-5945C6086208}" srcOrd="0" destOrd="0" presId="urn:microsoft.com/office/officeart/2005/8/layout/lProcess2"/>
-    <dgm:cxn modelId="{23C1CA13-450C-4288-BBF5-6033A0F2456B}" type="presOf" srcId="{979D7A78-5B4B-402E-B7CB-577E7A197AC0}" destId="{3D2B067F-8218-496A-ABBE-A56032863788}" srcOrd="0" destOrd="0" presId="urn:microsoft.com/office/officeart/2005/8/layout/lProcess2"/>
-    <dgm:cxn modelId="{DFE564D5-5893-4844-BE20-D1D3ABDD1BD7}" type="presOf" srcId="{B962C1BA-B9FA-4D7A-8BD3-A3AF853AAF72}" destId="{D6EB44A8-3624-4328-9EFE-FCF73899A0E5}" srcOrd="1" destOrd="0" presId="urn:microsoft.com/office/officeart/2005/8/layout/lProcess2"/>
-    <dgm:cxn modelId="{1CFD76AE-7A18-4344-9DEF-8B0BEC602612}" type="presOf" srcId="{0533D289-E72C-4D0C-905D-E556CDF5C9DE}" destId="{75473608-B74A-4E5F-B24F-6601E0D58C72}" srcOrd="0" destOrd="0" presId="urn:microsoft.com/office/officeart/2005/8/layout/lProcess2"/>
-    <dgm:cxn modelId="{E97DE9DE-2EE6-4525-A9C5-68952A3F8473}" type="presOf" srcId="{B8D10FDE-6E32-4F84-B637-86F1E1DA8F83}" destId="{6A6EFDF1-527A-4470-8A8C-D4C0F52C28A7}" srcOrd="0" destOrd="0" presId="urn:microsoft.com/office/officeart/2005/8/layout/lProcess2"/>
-    <dgm:cxn modelId="{880AE643-6AB7-4659-94AE-B07FD324211B}" type="presOf" srcId="{EBDBBDD9-E8CD-4891-A7C5-AFB462A5105D}" destId="{2938B3CD-317A-4E0F-8618-33F31DD14467}" srcOrd="1" destOrd="0" presId="urn:microsoft.com/office/officeart/2005/8/layout/lProcess2"/>
+    <dgm:cxn modelId="{E814EBA9-6637-489C-948B-C100D26A629B}" type="presOf" srcId="{A9E0CE7A-9932-41E2-B872-1C9DE3FAB7F3}" destId="{10D2C731-6E24-4768-A4A0-85DCEAC3BB39}" srcOrd="0" destOrd="0" presId="urn:microsoft.com/office/officeart/2005/8/layout/lProcess2"/>
     <dgm:cxn modelId="{35DF36AA-07D8-4BAD-82C7-C11569342897}" srcId="{979D7A78-5B4B-402E-B7CB-577E7A197AC0}" destId="{E75ACEDB-5C55-4725-B519-EDABBEF8255B}" srcOrd="2" destOrd="0" parTransId="{888BB770-DF07-4F6D-8DD4-8CC5CFF8E8F8}" sibTransId="{FE71FE87-243A-4931-B03D-2521D8EFDC74}"/>
     <dgm:cxn modelId="{5CBDCD59-843D-483C-8A5C-1A27ADB3EB5D}" srcId="{979D7A78-5B4B-402E-B7CB-577E7A197AC0}" destId="{37FB0BB7-1C36-4C78-BDC4-9B15D0A2EFBA}" srcOrd="0" destOrd="0" parTransId="{A33BCA85-AAE2-49B6-8363-DADFDB42EFA1}" sibTransId="{2821F068-F0AC-49B7-9D64-F312ECB5E19D}"/>
-    <dgm:cxn modelId="{E061392B-8E6D-46A3-BED7-182F9A578FCD}" srcId="{EBDBBDD9-E8CD-4891-A7C5-AFB462A5105D}" destId="{B2DFC4E7-C413-437B-A4C7-08E9A02414C1}" srcOrd="0" destOrd="0" parTransId="{F7420A7C-37FD-40D4-8F77-12E081B59003}" sibTransId="{2C07676D-C3F3-4208-A68E-912B5DE1B80E}"/>
-    <dgm:cxn modelId="{EF990CA9-D5EF-4EB9-B1B7-320943401B95}" srcId="{EBDBBDD9-E8CD-4891-A7C5-AFB462A5105D}" destId="{B8D10FDE-6E32-4F84-B637-86F1E1DA8F83}" srcOrd="1" destOrd="0" parTransId="{1712A861-5C83-4E19-804E-8BEDC9A8A465}" sibTransId="{812E89B7-AED1-4F73-8097-8FB4B08650FC}"/>
-    <dgm:cxn modelId="{C336922D-C74F-40E1-BC16-9FEA07E7F49F}" type="presOf" srcId="{2106692C-4A97-4081-B6B6-88556F2D42AC}" destId="{07143B47-B337-4D7B-956E-8A5174C66416}" srcOrd="0" destOrd="0" presId="urn:microsoft.com/office/officeart/2005/8/layout/lProcess2"/>
-    <dgm:cxn modelId="{3AB56C57-AD90-46AA-976A-F36A61F1DD8C}" type="presOf" srcId="{8CA5FB09-1BC0-4568-AF88-9FC0CB1ADBB1}" destId="{562C62FE-E524-4854-AA9A-CEDFDE8E5818}" srcOrd="0" destOrd="0" presId="urn:microsoft.com/office/officeart/2005/8/layout/lProcess2"/>
-    <dgm:cxn modelId="{E814EBA9-6637-489C-948B-C100D26A629B}" type="presOf" srcId="{A9E0CE7A-9932-41E2-B872-1C9DE3FAB7F3}" destId="{10D2C731-6E24-4768-A4A0-85DCEAC3BB39}" srcOrd="0" destOrd="0" presId="urn:microsoft.com/office/officeart/2005/8/layout/lProcess2"/>
-    <dgm:cxn modelId="{E0948AAD-52F0-4953-ACE3-1E50F47A12E1}" type="presOf" srcId="{979D7A78-5B4B-402E-B7CB-577E7A197AC0}" destId="{8AC9234D-F90F-4EF4-8B6C-3FC06301402C}" srcOrd="1" destOrd="0" presId="urn:microsoft.com/office/officeart/2005/8/layout/lProcess2"/>
     <dgm:cxn modelId="{309FEE62-5297-46E5-BEF7-56F2660E4FC1}" type="presParOf" srcId="{BF1F9459-AD9E-4534-B439-62A38B84A59C}" destId="{37434F99-D17D-4A72-A576-9F27DA12FB3A}" srcOrd="0" destOrd="0" presId="urn:microsoft.com/office/officeart/2005/8/layout/lProcess2"/>
     <dgm:cxn modelId="{77F3E007-4FC5-4FFA-B5C4-F9BEA6E08801}" type="presParOf" srcId="{37434F99-D17D-4A72-A576-9F27DA12FB3A}" destId="{3D2B067F-8218-496A-ABBE-A56032863788}" srcOrd="0" destOrd="0" presId="urn:microsoft.com/office/officeart/2005/8/layout/lProcess2"/>
     <dgm:cxn modelId="{DAA17115-E88D-462C-BC66-D25CBC4C5CA5}" type="presParOf" srcId="{37434F99-D17D-4A72-A576-9F27DA12FB3A}" destId="{8AC9234D-F90F-4EF4-8B6C-3FC06301402C}" srcOrd="1" destOrd="0" presId="urn:microsoft.com/office/officeart/2005/8/layout/lProcess2"/>
@@ -6967,7 +6955,7 @@
   <dgm:whole/>
   <dgm:extLst>
     <a:ext uri="http://schemas.microsoft.com/office/drawing/2008/diagram">
-      <dsp:dataModelExt xmlns:dsp="http://schemas.microsoft.com/office/drawing/2008/diagram" xmlns="" relId="rId6" minVer="http://schemas.openxmlformats.org/drawingml/2006/diagram"/>
+      <dsp:dataModelExt xmlns:dsp="http://schemas.microsoft.com/office/drawing/2008/diagram" relId="rId6" minVer="http://schemas.openxmlformats.org/drawingml/2006/diagram"/>
     </a:ext>
   </dgm:extLst>
 </dgm:dataModel>
@@ -7464,29 +7452,29 @@
     </dgm:pt>
   </dgm:ptLst>
   <dgm:cxnLst>
+    <dgm:cxn modelId="{3D421865-9245-40BE-A428-AC1395BBF1FD}" srcId="{6B15FE88-64A0-4BDC-AF83-88FF2B6BC0FF}" destId="{2E77E181-B26B-477D-AA76-8F562AC11203}" srcOrd="1" destOrd="0" parTransId="{1FC7590F-8835-485B-A97D-11AE303C9200}" sibTransId="{7866C9CC-9FD0-4706-85A4-B011606E4019}"/>
+    <dgm:cxn modelId="{0A31AAE1-112E-40DB-B561-789DE4FF33EA}" type="presOf" srcId="{5AE29B9C-DCC0-494D-B295-FCEDA7973737}" destId="{BDB241AA-7FE0-4808-B427-C756712D4FDC}" srcOrd="0" destOrd="0" presId="urn:microsoft.com/office/officeart/2005/8/layout/process1"/>
+    <dgm:cxn modelId="{9A2F6455-A699-4D81-9F0E-ED1F5CD1F077}" srcId="{5AE29B9C-DCC0-494D-B295-FCEDA7973737}" destId="{C6494674-916B-4A51-8844-D36A5D241F87}" srcOrd="2" destOrd="0" parTransId="{21E558BA-F9D2-49AB-B124-5FE52143BD79}" sibTransId="{6DA1D3BE-B313-4BA6-ADD7-4CD694E8704A}"/>
+    <dgm:cxn modelId="{B6024B8F-8796-4563-83D7-A435ECF9B728}" type="presOf" srcId="{31FC4690-C9C2-4ABA-B695-4839F7A9EBC8}" destId="{F3FA9A04-8CE0-4489-9A4B-B7FCD6C3E6FD}" srcOrd="1" destOrd="0" presId="urn:microsoft.com/office/officeart/2005/8/layout/process1"/>
+    <dgm:cxn modelId="{C14EDE5D-823E-4C8A-B3A2-E85A392CF5CC}" srcId="{6B15FE88-64A0-4BDC-AF83-88FF2B6BC0FF}" destId="{4D5A8DE8-3423-47A8-A523-925F06E919C5}" srcOrd="0" destOrd="0" parTransId="{00750962-D9F4-40B7-921F-1B54DCA4C922}" sibTransId="{F0D5DA5C-0CDF-4B15-87E2-53799E49D5D4}"/>
+    <dgm:cxn modelId="{66F74CA0-4165-436F-8CF4-07AE44E4ED0E}" srcId="{5AE29B9C-DCC0-494D-B295-FCEDA7973737}" destId="{C1B41F20-DA79-4D34-A3F5-324D8CEC29D6}" srcOrd="1" destOrd="0" parTransId="{18975149-1209-4EE5-976E-77F94FAE1A53}" sibTransId="{1B1C8373-348D-402D-A0C6-385A9221DB66}"/>
+    <dgm:cxn modelId="{9391F08B-54FA-41D2-BB9F-1C39A5D9B8C4}" type="presOf" srcId="{1B1C8373-348D-402D-A0C6-385A9221DB66}" destId="{888FE3F8-21A6-4F0F-9554-3DC89BD345DC}" srcOrd="0" destOrd="0" presId="urn:microsoft.com/office/officeart/2005/8/layout/process1"/>
+    <dgm:cxn modelId="{75B6A5A1-CA08-4CCD-B289-0AA3FD67416E}" type="presOf" srcId="{D7216735-18E6-4C73-9348-2CD2C406C141}" destId="{1559455D-FF03-4F2C-B903-F86D99F99432}" srcOrd="0" destOrd="0" presId="urn:microsoft.com/office/officeart/2005/8/layout/process1"/>
+    <dgm:cxn modelId="{816191D6-F2F5-4E7B-ABE0-0867A2F35493}" type="presOf" srcId="{31FC4690-C9C2-4ABA-B695-4839F7A9EBC8}" destId="{0D9814D9-9061-4F9B-B12F-1ECE0B4B61DF}" srcOrd="0" destOrd="0" presId="urn:microsoft.com/office/officeart/2005/8/layout/process1"/>
+    <dgm:cxn modelId="{F9DC0135-0056-4F19-A2E1-15C236BC798D}" type="presOf" srcId="{6DA1D3BE-B313-4BA6-ADD7-4CD694E8704A}" destId="{51568B92-F3CF-443C-B1E7-CEB32B643BB3}" srcOrd="1" destOrd="0" presId="urn:microsoft.com/office/officeart/2005/8/layout/process1"/>
+    <dgm:cxn modelId="{478AF862-F924-47E9-A16D-74E5B12570C4}" srcId="{5AE29B9C-DCC0-494D-B295-FCEDA7973737}" destId="{6B15FE88-64A0-4BDC-AF83-88FF2B6BC0FF}" srcOrd="3" destOrd="0" parTransId="{1E1D3846-5A64-4E8A-8603-CE351A382D83}" sibTransId="{31FC4690-C9C2-4ABA-B695-4839F7A9EBC8}"/>
+    <dgm:cxn modelId="{AA4ADCBE-4DED-4AA9-83F0-476549E1EC28}" type="presOf" srcId="{C6494674-916B-4A51-8844-D36A5D241F87}" destId="{4D016F65-4A05-44F8-9361-AAD0B272EEDF}" srcOrd="0" destOrd="0" presId="urn:microsoft.com/office/officeart/2005/8/layout/process1"/>
+    <dgm:cxn modelId="{6D4335AA-6D9F-45BC-9609-D8264207499B}" type="presOf" srcId="{7E70ED42-3516-4BF1-9494-083201766ED4}" destId="{C8A88A8F-3FB5-41D0-8A6C-63DB44DB87A9}" srcOrd="1" destOrd="0" presId="urn:microsoft.com/office/officeart/2005/8/layout/process1"/>
+    <dgm:cxn modelId="{7A51A3B5-5A2C-4D53-96ED-9130E09B9C2A}" type="presOf" srcId="{2E77E181-B26B-477D-AA76-8F562AC11203}" destId="{81F38DA9-58A3-41DD-9F0E-844EACA7D6A0}" srcOrd="0" destOrd="2" presId="urn:microsoft.com/office/officeart/2005/8/layout/process1"/>
     <dgm:cxn modelId="{B2665835-4B65-4BFF-9CC2-FF2E3764DE89}" srcId="{5AE29B9C-DCC0-494D-B295-FCEDA7973737}" destId="{D7216735-18E6-4C73-9348-2CD2C406C141}" srcOrd="0" destOrd="0" parTransId="{CDA51113-C5B9-4BAF-8E1F-9CDCEBD7B79C}" sibTransId="{7E70ED42-3516-4BF1-9494-083201766ED4}"/>
-    <dgm:cxn modelId="{6D4335AA-6D9F-45BC-9609-D8264207499B}" type="presOf" srcId="{7E70ED42-3516-4BF1-9494-083201766ED4}" destId="{C8A88A8F-3FB5-41D0-8A6C-63DB44DB87A9}" srcOrd="1" destOrd="0" presId="urn:microsoft.com/office/officeart/2005/8/layout/process1"/>
+    <dgm:cxn modelId="{9A56C50E-76A1-4FFA-8050-8171DF48118A}" type="presOf" srcId="{6B15FE88-64A0-4BDC-AF83-88FF2B6BC0FF}" destId="{81F38DA9-58A3-41DD-9F0E-844EACA7D6A0}" srcOrd="0" destOrd="0" presId="urn:microsoft.com/office/officeart/2005/8/layout/process1"/>
+    <dgm:cxn modelId="{1019EE3A-4F65-40DE-9671-FD37D7CB6D0D}" type="presOf" srcId="{1B1C8373-348D-402D-A0C6-385A9221DB66}" destId="{9BC736F0-5398-4FCE-8645-314480E6BCF8}" srcOrd="1" destOrd="0" presId="urn:microsoft.com/office/officeart/2005/8/layout/process1"/>
+    <dgm:cxn modelId="{E0302013-21A1-43C6-8218-434755B966EC}" type="presOf" srcId="{6DA1D3BE-B313-4BA6-ADD7-4CD694E8704A}" destId="{6FA5A5A1-59BF-4D24-84B0-047CB5726868}" srcOrd="0" destOrd="0" presId="urn:microsoft.com/office/officeart/2005/8/layout/process1"/>
+    <dgm:cxn modelId="{B7E95402-33B0-430A-8C0F-73431E3B0950}" type="presOf" srcId="{8F04D7CC-F44B-4E1E-BBA2-EDBB82C2D0AA}" destId="{525037E8-FA00-4D7A-8B7B-66B1EB308A67}" srcOrd="0" destOrd="0" presId="urn:microsoft.com/office/officeart/2005/8/layout/process1"/>
+    <dgm:cxn modelId="{D01667E1-49A6-417E-9A16-5FB5B590CED5}" type="presOf" srcId="{C1B41F20-DA79-4D34-A3F5-324D8CEC29D6}" destId="{C6EC3E19-D2F6-497F-B657-749808CA0028}" srcOrd="0" destOrd="0" presId="urn:microsoft.com/office/officeart/2005/8/layout/process1"/>
+    <dgm:cxn modelId="{1E7A0FCF-7CF7-4D47-9D64-AB07F5A5B604}" srcId="{5AE29B9C-DCC0-494D-B295-FCEDA7973737}" destId="{8F04D7CC-F44B-4E1E-BBA2-EDBB82C2D0AA}" srcOrd="4" destOrd="0" parTransId="{0E022D9E-920B-4FCD-9CBD-CA9050262430}" sibTransId="{31F19754-7B98-4D78-BD2D-08FB34E70DDB}"/>
     <dgm:cxn modelId="{488034FB-4C36-4583-8D48-F096C91716B4}" type="presOf" srcId="{7E70ED42-3516-4BF1-9494-083201766ED4}" destId="{FB4879E0-D376-444A-8FEA-F8408D6A32A9}" srcOrd="0" destOrd="0" presId="urn:microsoft.com/office/officeart/2005/8/layout/process1"/>
-    <dgm:cxn modelId="{3D421865-9245-40BE-A428-AC1395BBF1FD}" srcId="{6B15FE88-64A0-4BDC-AF83-88FF2B6BC0FF}" destId="{2E77E181-B26B-477D-AA76-8F562AC11203}" srcOrd="1" destOrd="0" parTransId="{1FC7590F-8835-485B-A97D-11AE303C9200}" sibTransId="{7866C9CC-9FD0-4706-85A4-B011606E4019}"/>
-    <dgm:cxn modelId="{AA4ADCBE-4DED-4AA9-83F0-476549E1EC28}" type="presOf" srcId="{C6494674-916B-4A51-8844-D36A5D241F87}" destId="{4D016F65-4A05-44F8-9361-AAD0B272EEDF}" srcOrd="0" destOrd="0" presId="urn:microsoft.com/office/officeart/2005/8/layout/process1"/>
-    <dgm:cxn modelId="{478AF862-F924-47E9-A16D-74E5B12570C4}" srcId="{5AE29B9C-DCC0-494D-B295-FCEDA7973737}" destId="{6B15FE88-64A0-4BDC-AF83-88FF2B6BC0FF}" srcOrd="3" destOrd="0" parTransId="{1E1D3846-5A64-4E8A-8603-CE351A382D83}" sibTransId="{31FC4690-C9C2-4ABA-B695-4839F7A9EBC8}"/>
-    <dgm:cxn modelId="{9A2F6455-A699-4D81-9F0E-ED1F5CD1F077}" srcId="{5AE29B9C-DCC0-494D-B295-FCEDA7973737}" destId="{C6494674-916B-4A51-8844-D36A5D241F87}" srcOrd="2" destOrd="0" parTransId="{21E558BA-F9D2-49AB-B124-5FE52143BD79}" sibTransId="{6DA1D3BE-B313-4BA6-ADD7-4CD694E8704A}"/>
-    <dgm:cxn modelId="{B7E95402-33B0-430A-8C0F-73431E3B0950}" type="presOf" srcId="{8F04D7CC-F44B-4E1E-BBA2-EDBB82C2D0AA}" destId="{525037E8-FA00-4D7A-8B7B-66B1EB308A67}" srcOrd="0" destOrd="0" presId="urn:microsoft.com/office/officeart/2005/8/layout/process1"/>
-    <dgm:cxn modelId="{9A56C50E-76A1-4FFA-8050-8171DF48118A}" type="presOf" srcId="{6B15FE88-64A0-4BDC-AF83-88FF2B6BC0FF}" destId="{81F38DA9-58A3-41DD-9F0E-844EACA7D6A0}" srcOrd="0" destOrd="0" presId="urn:microsoft.com/office/officeart/2005/8/layout/process1"/>
-    <dgm:cxn modelId="{F9DC0135-0056-4F19-A2E1-15C236BC798D}" type="presOf" srcId="{6DA1D3BE-B313-4BA6-ADD7-4CD694E8704A}" destId="{51568B92-F3CF-443C-B1E7-CEB32B643BB3}" srcOrd="1" destOrd="0" presId="urn:microsoft.com/office/officeart/2005/8/layout/process1"/>
-    <dgm:cxn modelId="{7A51A3B5-5A2C-4D53-96ED-9130E09B9C2A}" type="presOf" srcId="{2E77E181-B26B-477D-AA76-8F562AC11203}" destId="{81F38DA9-58A3-41DD-9F0E-844EACA7D6A0}" srcOrd="0" destOrd="2" presId="urn:microsoft.com/office/officeart/2005/8/layout/process1"/>
-    <dgm:cxn modelId="{0A31AAE1-112E-40DB-B561-789DE4FF33EA}" type="presOf" srcId="{5AE29B9C-DCC0-494D-B295-FCEDA7973737}" destId="{BDB241AA-7FE0-4808-B427-C756712D4FDC}" srcOrd="0" destOrd="0" presId="urn:microsoft.com/office/officeart/2005/8/layout/process1"/>
-    <dgm:cxn modelId="{D01667E1-49A6-417E-9A16-5FB5B590CED5}" type="presOf" srcId="{C1B41F20-DA79-4D34-A3F5-324D8CEC29D6}" destId="{C6EC3E19-D2F6-497F-B657-749808CA0028}" srcOrd="0" destOrd="0" presId="urn:microsoft.com/office/officeart/2005/8/layout/process1"/>
-    <dgm:cxn modelId="{816191D6-F2F5-4E7B-ABE0-0867A2F35493}" type="presOf" srcId="{31FC4690-C9C2-4ABA-B695-4839F7A9EBC8}" destId="{0D9814D9-9061-4F9B-B12F-1ECE0B4B61DF}" srcOrd="0" destOrd="0" presId="urn:microsoft.com/office/officeart/2005/8/layout/process1"/>
-    <dgm:cxn modelId="{1019EE3A-4F65-40DE-9671-FD37D7CB6D0D}" type="presOf" srcId="{1B1C8373-348D-402D-A0C6-385A9221DB66}" destId="{9BC736F0-5398-4FCE-8645-314480E6BCF8}" srcOrd="1" destOrd="0" presId="urn:microsoft.com/office/officeart/2005/8/layout/process1"/>
-    <dgm:cxn modelId="{B6024B8F-8796-4563-83D7-A435ECF9B728}" type="presOf" srcId="{31FC4690-C9C2-4ABA-B695-4839F7A9EBC8}" destId="{F3FA9A04-8CE0-4489-9A4B-B7FCD6C3E6FD}" srcOrd="1" destOrd="0" presId="urn:microsoft.com/office/officeart/2005/8/layout/process1"/>
-    <dgm:cxn modelId="{66F74CA0-4165-436F-8CF4-07AE44E4ED0E}" srcId="{5AE29B9C-DCC0-494D-B295-FCEDA7973737}" destId="{C1B41F20-DA79-4D34-A3F5-324D8CEC29D6}" srcOrd="1" destOrd="0" parTransId="{18975149-1209-4EE5-976E-77F94FAE1A53}" sibTransId="{1B1C8373-348D-402D-A0C6-385A9221DB66}"/>
-    <dgm:cxn modelId="{75B6A5A1-CA08-4CCD-B289-0AA3FD67416E}" type="presOf" srcId="{D7216735-18E6-4C73-9348-2CD2C406C141}" destId="{1559455D-FF03-4F2C-B903-F86D99F99432}" srcOrd="0" destOrd="0" presId="urn:microsoft.com/office/officeart/2005/8/layout/process1"/>
-    <dgm:cxn modelId="{E0302013-21A1-43C6-8218-434755B966EC}" type="presOf" srcId="{6DA1D3BE-B313-4BA6-ADD7-4CD694E8704A}" destId="{6FA5A5A1-59BF-4D24-84B0-047CB5726868}" srcOrd="0" destOrd="0" presId="urn:microsoft.com/office/officeart/2005/8/layout/process1"/>
     <dgm:cxn modelId="{B5F676E0-6EAB-4CEE-919C-A8A72A1D732F}" type="presOf" srcId="{4D5A8DE8-3423-47A8-A523-925F06E919C5}" destId="{81F38DA9-58A3-41DD-9F0E-844EACA7D6A0}" srcOrd="0" destOrd="1" presId="urn:microsoft.com/office/officeart/2005/8/layout/process1"/>
-    <dgm:cxn modelId="{9391F08B-54FA-41D2-BB9F-1C39A5D9B8C4}" type="presOf" srcId="{1B1C8373-348D-402D-A0C6-385A9221DB66}" destId="{888FE3F8-21A6-4F0F-9554-3DC89BD345DC}" srcOrd="0" destOrd="0" presId="urn:microsoft.com/office/officeart/2005/8/layout/process1"/>
-    <dgm:cxn modelId="{C14EDE5D-823E-4C8A-B3A2-E85A392CF5CC}" srcId="{6B15FE88-64A0-4BDC-AF83-88FF2B6BC0FF}" destId="{4D5A8DE8-3423-47A8-A523-925F06E919C5}" srcOrd="0" destOrd="0" parTransId="{00750962-D9F4-40B7-921F-1B54DCA4C922}" sibTransId="{F0D5DA5C-0CDF-4B15-87E2-53799E49D5D4}"/>
-    <dgm:cxn modelId="{1E7A0FCF-7CF7-4D47-9D64-AB07F5A5B604}" srcId="{5AE29B9C-DCC0-494D-B295-FCEDA7973737}" destId="{8F04D7CC-F44B-4E1E-BBA2-EDBB82C2D0AA}" srcOrd="4" destOrd="0" parTransId="{0E022D9E-920B-4FCD-9CBD-CA9050262430}" sibTransId="{31F19754-7B98-4D78-BD2D-08FB34E70DDB}"/>
     <dgm:cxn modelId="{B0ACA35B-AE7B-41F6-A6E1-11D112DE5C11}" type="presParOf" srcId="{BDB241AA-7FE0-4808-B427-C756712D4FDC}" destId="{1559455D-FF03-4F2C-B903-F86D99F99432}" srcOrd="0" destOrd="0" presId="urn:microsoft.com/office/officeart/2005/8/layout/process1"/>
     <dgm:cxn modelId="{F040FDE8-B800-4880-A294-F351922E245A}" type="presParOf" srcId="{BDB241AA-7FE0-4808-B427-C756712D4FDC}" destId="{FB4879E0-D376-444A-8FEA-F8408D6A32A9}" srcOrd="1" destOrd="0" presId="urn:microsoft.com/office/officeart/2005/8/layout/process1"/>
     <dgm:cxn modelId="{9E0E113A-94FA-4DEB-9BE6-39781E920B82}" type="presParOf" srcId="{FB4879E0-D376-444A-8FEA-F8408D6A32A9}" destId="{C8A88A8F-3FB5-41D0-8A6C-63DB44DB87A9}" srcOrd="0" destOrd="0" presId="urn:microsoft.com/office/officeart/2005/8/layout/process1"/>
@@ -7505,7 +7493,7 @@
   <dgm:whole/>
   <dgm:extLst>
     <a:ext uri="http://schemas.microsoft.com/office/drawing/2008/diagram">
-      <dsp:dataModelExt xmlns:dsp="http://schemas.microsoft.com/office/drawing/2008/diagram" xmlns="" relId="rId6" minVer="http://schemas.openxmlformats.org/drawingml/2006/diagram"/>
+      <dsp:dataModelExt xmlns:dsp="http://schemas.microsoft.com/office/drawing/2008/diagram" relId="rId6" minVer="http://schemas.openxmlformats.org/drawingml/2006/diagram"/>
     </a:ext>
   </dgm:extLst>
 </dgm:dataModel>
@@ -8033,25 +8021,25 @@
     </dgm:pt>
   </dgm:ptLst>
   <dgm:cxnLst>
-    <dgm:cxn modelId="{B2665835-4B65-4BFF-9CC2-FF2E3764DE89}" srcId="{5AE29B9C-DCC0-494D-B295-FCEDA7973737}" destId="{D7216735-18E6-4C73-9348-2CD2C406C141}" srcOrd="0" destOrd="0" parTransId="{CDA51113-C5B9-4BAF-8E1F-9CDCEBD7B79C}" sibTransId="{7E70ED42-3516-4BF1-9494-083201766ED4}"/>
-    <dgm:cxn modelId="{737BC40F-70C4-464D-AB45-5982670AA3EB}" type="presOf" srcId="{31FC4690-C9C2-4ABA-B695-4839F7A9EBC8}" destId="{F3FA9A04-8CE0-4489-9A4B-B7FCD6C3E6FD}" srcOrd="1" destOrd="0" presId="urn:microsoft.com/office/officeart/2005/8/layout/process1"/>
-    <dgm:cxn modelId="{AED98CC6-33B9-4FDA-BA99-D4C039375B92}" type="presOf" srcId="{7E70ED42-3516-4BF1-9494-083201766ED4}" destId="{FB4879E0-D376-444A-8FEA-F8408D6A32A9}" srcOrd="0" destOrd="0" presId="urn:microsoft.com/office/officeart/2005/8/layout/process1"/>
-    <dgm:cxn modelId="{CDC3D8C8-8312-4CAE-B449-7998129946FA}" type="presOf" srcId="{6B15FE88-64A0-4BDC-AF83-88FF2B6BC0FF}" destId="{81F38DA9-58A3-41DD-9F0E-844EACA7D6A0}" srcOrd="0" destOrd="0" presId="urn:microsoft.com/office/officeart/2005/8/layout/process1"/>
-    <dgm:cxn modelId="{478AF862-F924-47E9-A16D-74E5B12570C4}" srcId="{5AE29B9C-DCC0-494D-B295-FCEDA7973737}" destId="{6B15FE88-64A0-4BDC-AF83-88FF2B6BC0FF}" srcOrd="3" destOrd="0" parTransId="{1E1D3846-5A64-4E8A-8603-CE351A382D83}" sibTransId="{31FC4690-C9C2-4ABA-B695-4839F7A9EBC8}"/>
+    <dgm:cxn modelId="{9F3EA037-0D9E-4597-9F53-CDAD2C340659}" type="presOf" srcId="{C6494674-916B-4A51-8844-D36A5D241F87}" destId="{4D016F65-4A05-44F8-9361-AAD0B272EEDF}" srcOrd="0" destOrd="0" presId="urn:microsoft.com/office/officeart/2005/8/layout/process1"/>
     <dgm:cxn modelId="{9A2F6455-A699-4D81-9F0E-ED1F5CD1F077}" srcId="{5AE29B9C-DCC0-494D-B295-FCEDA7973737}" destId="{C6494674-916B-4A51-8844-D36A5D241F87}" srcOrd="2" destOrd="0" parTransId="{21E558BA-F9D2-49AB-B124-5FE52143BD79}" sibTransId="{6DA1D3BE-B313-4BA6-ADD7-4CD694E8704A}"/>
-    <dgm:cxn modelId="{3439634F-6A64-4B19-8553-46EBBC81E71E}" type="presOf" srcId="{6DA1D3BE-B313-4BA6-ADD7-4CD694E8704A}" destId="{6FA5A5A1-59BF-4D24-84B0-047CB5726868}" srcOrd="0" destOrd="0" presId="urn:microsoft.com/office/officeart/2005/8/layout/process1"/>
-    <dgm:cxn modelId="{E7EEE0D5-9AC3-4CB3-8AD1-A1F3B3BEEBAC}" type="presOf" srcId="{31FC4690-C9C2-4ABA-B695-4839F7A9EBC8}" destId="{0D9814D9-9061-4F9B-B12F-1ECE0B4B61DF}" srcOrd="0" destOrd="0" presId="urn:microsoft.com/office/officeart/2005/8/layout/process1"/>
-    <dgm:cxn modelId="{2239AE9C-3766-434B-A228-0F72735E1097}" type="presOf" srcId="{1B1C8373-348D-402D-A0C6-385A9221DB66}" destId="{888FE3F8-21A6-4F0F-9554-3DC89BD345DC}" srcOrd="0" destOrd="0" presId="urn:microsoft.com/office/officeart/2005/8/layout/process1"/>
     <dgm:cxn modelId="{473E8D85-A480-4ABB-95FF-EC52350BC39A}" type="presOf" srcId="{5AE29B9C-DCC0-494D-B295-FCEDA7973737}" destId="{BDB241AA-7FE0-4808-B427-C756712D4FDC}" srcOrd="0" destOrd="0" presId="urn:microsoft.com/office/officeart/2005/8/layout/process1"/>
-    <dgm:cxn modelId="{9F3EA037-0D9E-4597-9F53-CDAD2C340659}" type="presOf" srcId="{C6494674-916B-4A51-8844-D36A5D241F87}" destId="{4D016F65-4A05-44F8-9361-AAD0B272EEDF}" srcOrd="0" destOrd="0" presId="urn:microsoft.com/office/officeart/2005/8/layout/process1"/>
+    <dgm:cxn modelId="{8376EEF1-11DD-4EF1-9DAA-718BF61A7597}" type="presOf" srcId="{8F04D7CC-F44B-4E1E-BBA2-EDBB82C2D0AA}" destId="{525037E8-FA00-4D7A-8B7B-66B1EB308A67}" srcOrd="0" destOrd="0" presId="urn:microsoft.com/office/officeart/2005/8/layout/process1"/>
     <dgm:cxn modelId="{CF413CEA-83A4-4226-97BE-D8279116612D}" type="presOf" srcId="{6DA1D3BE-B313-4BA6-ADD7-4CD694E8704A}" destId="{51568B92-F3CF-443C-B1E7-CEB32B643BB3}" srcOrd="1" destOrd="0" presId="urn:microsoft.com/office/officeart/2005/8/layout/process1"/>
     <dgm:cxn modelId="{66F74CA0-4165-436F-8CF4-07AE44E4ED0E}" srcId="{5AE29B9C-DCC0-494D-B295-FCEDA7973737}" destId="{C1B41F20-DA79-4D34-A3F5-324D8CEC29D6}" srcOrd="1" destOrd="0" parTransId="{18975149-1209-4EE5-976E-77F94FAE1A53}" sibTransId="{1B1C8373-348D-402D-A0C6-385A9221DB66}"/>
+    <dgm:cxn modelId="{B2FD5EB5-B561-473D-A4A9-C3D9D0F06199}" type="presOf" srcId="{1B1C8373-348D-402D-A0C6-385A9221DB66}" destId="{9BC736F0-5398-4FCE-8645-314480E6BCF8}" srcOrd="1" destOrd="0" presId="urn:microsoft.com/office/officeart/2005/8/layout/process1"/>
+    <dgm:cxn modelId="{737BC40F-70C4-464D-AB45-5982670AA3EB}" type="presOf" srcId="{31FC4690-C9C2-4ABA-B695-4839F7A9EBC8}" destId="{F3FA9A04-8CE0-4489-9A4B-B7FCD6C3E6FD}" srcOrd="1" destOrd="0" presId="urn:microsoft.com/office/officeart/2005/8/layout/process1"/>
     <dgm:cxn modelId="{04BFA8DB-A59E-437F-B963-66D781184978}" type="presOf" srcId="{C1B41F20-DA79-4D34-A3F5-324D8CEC29D6}" destId="{C6EC3E19-D2F6-497F-B657-749808CA0028}" srcOrd="0" destOrd="0" presId="urn:microsoft.com/office/officeart/2005/8/layout/process1"/>
     <dgm:cxn modelId="{85B5E09D-E19A-4533-A970-EDD395F3DE7C}" type="presOf" srcId="{7E70ED42-3516-4BF1-9494-083201766ED4}" destId="{C8A88A8F-3FB5-41D0-8A6C-63DB44DB87A9}" srcOrd="1" destOrd="0" presId="urn:microsoft.com/office/officeart/2005/8/layout/process1"/>
-    <dgm:cxn modelId="{8376EEF1-11DD-4EF1-9DAA-718BF61A7597}" type="presOf" srcId="{8F04D7CC-F44B-4E1E-BBA2-EDBB82C2D0AA}" destId="{525037E8-FA00-4D7A-8B7B-66B1EB308A67}" srcOrd="0" destOrd="0" presId="urn:microsoft.com/office/officeart/2005/8/layout/process1"/>
-    <dgm:cxn modelId="{B2FD5EB5-B561-473D-A4A9-C3D9D0F06199}" type="presOf" srcId="{1B1C8373-348D-402D-A0C6-385A9221DB66}" destId="{9BC736F0-5398-4FCE-8645-314480E6BCF8}" srcOrd="1" destOrd="0" presId="urn:microsoft.com/office/officeart/2005/8/layout/process1"/>
+    <dgm:cxn modelId="{478AF862-F924-47E9-A16D-74E5B12570C4}" srcId="{5AE29B9C-DCC0-494D-B295-FCEDA7973737}" destId="{6B15FE88-64A0-4BDC-AF83-88FF2B6BC0FF}" srcOrd="3" destOrd="0" parTransId="{1E1D3846-5A64-4E8A-8603-CE351A382D83}" sibTransId="{31FC4690-C9C2-4ABA-B695-4839F7A9EBC8}"/>
+    <dgm:cxn modelId="{B2665835-4B65-4BFF-9CC2-FF2E3764DE89}" srcId="{5AE29B9C-DCC0-494D-B295-FCEDA7973737}" destId="{D7216735-18E6-4C73-9348-2CD2C406C141}" srcOrd="0" destOrd="0" parTransId="{CDA51113-C5B9-4BAF-8E1F-9CDCEBD7B79C}" sibTransId="{7E70ED42-3516-4BF1-9494-083201766ED4}"/>
+    <dgm:cxn modelId="{2239AE9C-3766-434B-A228-0F72735E1097}" type="presOf" srcId="{1B1C8373-348D-402D-A0C6-385A9221DB66}" destId="{888FE3F8-21A6-4F0F-9554-3DC89BD345DC}" srcOrd="0" destOrd="0" presId="urn:microsoft.com/office/officeart/2005/8/layout/process1"/>
+    <dgm:cxn modelId="{CDC3D8C8-8312-4CAE-B449-7998129946FA}" type="presOf" srcId="{6B15FE88-64A0-4BDC-AF83-88FF2B6BC0FF}" destId="{81F38DA9-58A3-41DD-9F0E-844EACA7D6A0}" srcOrd="0" destOrd="0" presId="urn:microsoft.com/office/officeart/2005/8/layout/process1"/>
+    <dgm:cxn modelId="{E7EEE0D5-9AC3-4CB3-8AD1-A1F3B3BEEBAC}" type="presOf" srcId="{31FC4690-C9C2-4ABA-B695-4839F7A9EBC8}" destId="{0D9814D9-9061-4F9B-B12F-1ECE0B4B61DF}" srcOrd="0" destOrd="0" presId="urn:microsoft.com/office/officeart/2005/8/layout/process1"/>
     <dgm:cxn modelId="{77FB21AD-4774-4009-B285-93F44AE3DBAD}" type="presOf" srcId="{D7216735-18E6-4C73-9348-2CD2C406C141}" destId="{1559455D-FF03-4F2C-B903-F86D99F99432}" srcOrd="0" destOrd="0" presId="urn:microsoft.com/office/officeart/2005/8/layout/process1"/>
+    <dgm:cxn modelId="{3439634F-6A64-4B19-8553-46EBBC81E71E}" type="presOf" srcId="{6DA1D3BE-B313-4BA6-ADD7-4CD694E8704A}" destId="{6FA5A5A1-59BF-4D24-84B0-047CB5726868}" srcOrd="0" destOrd="0" presId="urn:microsoft.com/office/officeart/2005/8/layout/process1"/>
     <dgm:cxn modelId="{1E7A0FCF-7CF7-4D47-9D64-AB07F5A5B604}" srcId="{5AE29B9C-DCC0-494D-B295-FCEDA7973737}" destId="{8F04D7CC-F44B-4E1E-BBA2-EDBB82C2D0AA}" srcOrd="4" destOrd="0" parTransId="{0E022D9E-920B-4FCD-9CBD-CA9050262430}" sibTransId="{31F19754-7B98-4D78-BD2D-08FB34E70DDB}"/>
+    <dgm:cxn modelId="{AED98CC6-33B9-4FDA-BA99-D4C039375B92}" type="presOf" srcId="{7E70ED42-3516-4BF1-9494-083201766ED4}" destId="{FB4879E0-D376-444A-8FEA-F8408D6A32A9}" srcOrd="0" destOrd="0" presId="urn:microsoft.com/office/officeart/2005/8/layout/process1"/>
     <dgm:cxn modelId="{FE06B6CD-DB73-42C0-813F-6CD60C205E38}" type="presParOf" srcId="{BDB241AA-7FE0-4808-B427-C756712D4FDC}" destId="{1559455D-FF03-4F2C-B903-F86D99F99432}" srcOrd="0" destOrd="0" presId="urn:microsoft.com/office/officeart/2005/8/layout/process1"/>
     <dgm:cxn modelId="{B9C592EF-0E01-4E88-B242-800A8E34DB9F}" type="presParOf" srcId="{BDB241AA-7FE0-4808-B427-C756712D4FDC}" destId="{FB4879E0-D376-444A-8FEA-F8408D6A32A9}" srcOrd="1" destOrd="0" presId="urn:microsoft.com/office/officeart/2005/8/layout/process1"/>
     <dgm:cxn modelId="{62FAF35C-71B9-400E-96AA-B87FEB13A4FC}" type="presParOf" srcId="{FB4879E0-D376-444A-8FEA-F8408D6A32A9}" destId="{C8A88A8F-3FB5-41D0-8A6C-63DB44DB87A9}" srcOrd="0" destOrd="0" presId="urn:microsoft.com/office/officeart/2005/8/layout/process1"/>
@@ -8070,7 +8058,7 @@
   <dgm:whole/>
   <dgm:extLst>
     <a:ext uri="http://schemas.microsoft.com/office/drawing/2008/diagram">
-      <dsp:dataModelExt xmlns:dsp="http://schemas.microsoft.com/office/drawing/2008/diagram" xmlns="" relId="rId6" minVer="http://schemas.openxmlformats.org/drawingml/2006/diagram"/>
+      <dsp:dataModelExt xmlns:dsp="http://schemas.microsoft.com/office/drawing/2008/diagram" relId="rId6" minVer="http://schemas.openxmlformats.org/drawingml/2006/diagram"/>
     </a:ext>
   </dgm:extLst>
 </dgm:dataModel>
@@ -8744,25 +8732,25 @@
     </dgm:pt>
   </dgm:ptLst>
   <dgm:cxnLst>
+    <dgm:cxn modelId="{B02E7494-5315-450E-B3B3-2925F91CC108}" srcId="{FB641364-DD55-4651-87F1-17577D60BCEE}" destId="{8A68058C-AC41-4F37-853A-753F6B953DD3}" srcOrd="2" destOrd="0" parTransId="{63BCE89E-7599-48E7-B8F1-ED58A12D724D}" sibTransId="{36ADCED1-2366-48BC-B601-D15FEDE44EB3}"/>
+    <dgm:cxn modelId="{1E7FF234-FDEF-4B01-8B3E-B7FB1D1ABDAE}" type="presOf" srcId="{68B5F292-5E35-4807-B0F6-8B4EC59225E7}" destId="{5F7E5708-2772-437B-ADA7-736FAAAC2B8A}" srcOrd="0" destOrd="0" presId="urn:microsoft.com/office/officeart/2005/8/layout/hierarchy4"/>
+    <dgm:cxn modelId="{F584F123-61AA-4E60-AEA3-F0B57B902BA0}" type="presOf" srcId="{025226CC-EFBC-4D7D-8694-87C9BBDD6F61}" destId="{76C443C6-C06D-49EC-9ADC-FCEEB6885D82}" srcOrd="0" destOrd="0" presId="urn:microsoft.com/office/officeart/2005/8/layout/hierarchy4"/>
     <dgm:cxn modelId="{00677664-94A2-4806-85FC-38DD8C49D529}" type="presOf" srcId="{FB641364-DD55-4651-87F1-17577D60BCEE}" destId="{7DF13B49-2E20-44FB-8E6A-FB065603BD36}" srcOrd="0" destOrd="0" presId="urn:microsoft.com/office/officeart/2005/8/layout/hierarchy4"/>
+    <dgm:cxn modelId="{57E3337A-0F6F-4438-82FA-D0600EE23412}" type="presOf" srcId="{B7547AB6-4DBC-4F6E-9175-94419C59A753}" destId="{65BB2561-1BFB-4282-9B48-E6B15BBE6760}" srcOrd="0" destOrd="0" presId="urn:microsoft.com/office/officeart/2005/8/layout/hierarchy4"/>
+    <dgm:cxn modelId="{CDD04E82-1FDB-4EA7-BCE8-0E6837B9A46D}" type="presOf" srcId="{B01411C6-06C6-4919-9106-2DDDADD784BB}" destId="{650A12E1-8522-4D05-AA2C-4ECA0A47E3FB}" srcOrd="0" destOrd="0" presId="urn:microsoft.com/office/officeart/2005/8/layout/hierarchy4"/>
+    <dgm:cxn modelId="{448F758A-12AD-4B4C-9838-8812AB6530C6}" srcId="{DCA9DA11-8F69-4C58-AE45-67A4935D4FE3}" destId="{1EAF6AC1-C035-46DC-A312-61B7B1733DDA}" srcOrd="0" destOrd="0" parTransId="{42F8A224-8791-402C-A685-225A22F63571}" sibTransId="{067ABEBF-4CA5-41A7-AFFD-7BA60B698E80}"/>
+    <dgm:cxn modelId="{4B7E34EC-45AC-4C56-98EA-04B36E84D602}" type="presOf" srcId="{1EAF6AC1-C035-46DC-A312-61B7B1733DDA}" destId="{E1474752-7981-453A-8AC9-D4BC3EC1A35A}" srcOrd="0" destOrd="0" presId="urn:microsoft.com/office/officeart/2005/8/layout/hierarchy4"/>
+    <dgm:cxn modelId="{A02C94A5-F066-403B-BEF7-E9ACFC335B4C}" type="presOf" srcId="{DCA9DA11-8F69-4C58-AE45-67A4935D4FE3}" destId="{EBDEC654-6A69-4DB1-9502-97225948F683}" srcOrd="0" destOrd="0" presId="urn:microsoft.com/office/officeart/2005/8/layout/hierarchy4"/>
+    <dgm:cxn modelId="{25A13A1E-12A0-4732-98FD-37EEFCD14ECF}" type="presOf" srcId="{7939B98A-7D1A-4C5D-8E77-80D62ED57131}" destId="{3535F8EB-B400-455A-ADBE-F075582911E2}" srcOrd="0" destOrd="0" presId="urn:microsoft.com/office/officeart/2005/8/layout/hierarchy4"/>
+    <dgm:cxn modelId="{AD953DDA-C3A4-4F9A-800F-1383BC382BCA}" srcId="{025226CC-EFBC-4D7D-8694-87C9BBDD6F61}" destId="{68B5F292-5E35-4807-B0F6-8B4EC59225E7}" srcOrd="0" destOrd="0" parTransId="{BDA1E3DA-16B6-4AF4-B1F2-D40698D1F65A}" sibTransId="{C49BB10B-421F-4066-AE04-BDE2F62714C9}"/>
+    <dgm:cxn modelId="{C2969C60-DEC7-4FAF-81ED-A8CFA583C032}" srcId="{FB641364-DD55-4651-87F1-17577D60BCEE}" destId="{B01411C6-06C6-4919-9106-2DDDADD784BB}" srcOrd="0" destOrd="0" parTransId="{B2B1A4E5-8551-40E5-8F58-04FEEFFDED41}" sibTransId="{94BDD0E0-20AC-46E9-896A-0E671C5DFE16}"/>
+    <dgm:cxn modelId="{07A2A366-4B48-4040-BF28-88750C669AED}" srcId="{68B5F292-5E35-4807-B0F6-8B4EC59225E7}" destId="{DCA9DA11-8F69-4C58-AE45-67A4935D4FE3}" srcOrd="1" destOrd="0" parTransId="{9206E045-C31D-42F8-BD2E-812382B47A89}" sibTransId="{B1641056-6AF7-41A8-9878-2B22233EFC3F}"/>
+    <dgm:cxn modelId="{D33310B5-2669-4B91-9B4B-BEBA1E6C5A0E}" type="presOf" srcId="{8A68058C-AC41-4F37-853A-753F6B953DD3}" destId="{C338C36F-0FC5-434E-BEB0-F2C582011F19}" srcOrd="0" destOrd="0" presId="urn:microsoft.com/office/officeart/2005/8/layout/hierarchy4"/>
+    <dgm:cxn modelId="{39A93F89-827C-41A4-8E25-0BDD819835AF}" srcId="{68B5F292-5E35-4807-B0F6-8B4EC59225E7}" destId="{FB641364-DD55-4651-87F1-17577D60BCEE}" srcOrd="0" destOrd="0" parTransId="{C1FA6D31-5666-4107-A56D-03BC07243C56}" sibTransId="{045FBE24-21AF-480B-B400-189D6DCFD281}"/>
     <dgm:cxn modelId="{C8B6E1F9-ABAD-4035-8DCA-2C37759A8F13}" srcId="{DCA9DA11-8F69-4C58-AE45-67A4935D4FE3}" destId="{B7547AB6-4DBC-4F6E-9175-94419C59A753}" srcOrd="1" destOrd="0" parTransId="{E40C287B-2DF5-48EA-89F8-913044C4EBFC}" sibTransId="{D7BD941F-7FD7-47D1-98A8-C68CBEC79658}"/>
-    <dgm:cxn modelId="{B02E7494-5315-450E-B3B3-2925F91CC108}" srcId="{FB641364-DD55-4651-87F1-17577D60BCEE}" destId="{8A68058C-AC41-4F37-853A-753F6B953DD3}" srcOrd="2" destOrd="0" parTransId="{63BCE89E-7599-48E7-B8F1-ED58A12D724D}" sibTransId="{36ADCED1-2366-48BC-B601-D15FEDE44EB3}"/>
-    <dgm:cxn modelId="{AD953DDA-C3A4-4F9A-800F-1383BC382BCA}" srcId="{025226CC-EFBC-4D7D-8694-87C9BBDD6F61}" destId="{68B5F292-5E35-4807-B0F6-8B4EC59225E7}" srcOrd="0" destOrd="0" parTransId="{BDA1E3DA-16B6-4AF4-B1F2-D40698D1F65A}" sibTransId="{C49BB10B-421F-4066-AE04-BDE2F62714C9}"/>
+    <dgm:cxn modelId="{F791BAEE-BF0F-4734-B299-89A363CEDA1A}" type="presOf" srcId="{E79FA759-841C-4396-91D9-F0DA650FC191}" destId="{E45DF21C-76A2-4286-90FB-3ED927B51613}" srcOrd="0" destOrd="0" presId="urn:microsoft.com/office/officeart/2005/8/layout/hierarchy4"/>
     <dgm:cxn modelId="{09C2DE89-4F2F-4809-AA9C-BA32B9E5335C}" srcId="{68B5F292-5E35-4807-B0F6-8B4EC59225E7}" destId="{E79FA759-841C-4396-91D9-F0DA650FC191}" srcOrd="2" destOrd="0" parTransId="{85A6443E-FEC8-4418-9206-C301A1573CDF}" sibTransId="{A90A644D-D7C2-49F6-9F48-CB59377E40A9}"/>
-    <dgm:cxn modelId="{A02C94A5-F066-403B-BEF7-E9ACFC335B4C}" type="presOf" srcId="{DCA9DA11-8F69-4C58-AE45-67A4935D4FE3}" destId="{EBDEC654-6A69-4DB1-9502-97225948F683}" srcOrd="0" destOrd="0" presId="urn:microsoft.com/office/officeart/2005/8/layout/hierarchy4"/>
-    <dgm:cxn modelId="{39A93F89-827C-41A4-8E25-0BDD819835AF}" srcId="{68B5F292-5E35-4807-B0F6-8B4EC59225E7}" destId="{FB641364-DD55-4651-87F1-17577D60BCEE}" srcOrd="0" destOrd="0" parTransId="{C1FA6D31-5666-4107-A56D-03BC07243C56}" sibTransId="{045FBE24-21AF-480B-B400-189D6DCFD281}"/>
-    <dgm:cxn modelId="{4B7E34EC-45AC-4C56-98EA-04B36E84D602}" type="presOf" srcId="{1EAF6AC1-C035-46DC-A312-61B7B1733DDA}" destId="{E1474752-7981-453A-8AC9-D4BC3EC1A35A}" srcOrd="0" destOrd="0" presId="urn:microsoft.com/office/officeart/2005/8/layout/hierarchy4"/>
-    <dgm:cxn modelId="{D33310B5-2669-4B91-9B4B-BEBA1E6C5A0E}" type="presOf" srcId="{8A68058C-AC41-4F37-853A-753F6B953DD3}" destId="{C338C36F-0FC5-434E-BEB0-F2C582011F19}" srcOrd="0" destOrd="0" presId="urn:microsoft.com/office/officeart/2005/8/layout/hierarchy4"/>
-    <dgm:cxn modelId="{CDD04E82-1FDB-4EA7-BCE8-0E6837B9A46D}" type="presOf" srcId="{B01411C6-06C6-4919-9106-2DDDADD784BB}" destId="{650A12E1-8522-4D05-AA2C-4ECA0A47E3FB}" srcOrd="0" destOrd="0" presId="urn:microsoft.com/office/officeart/2005/8/layout/hierarchy4"/>
-    <dgm:cxn modelId="{07A2A366-4B48-4040-BF28-88750C669AED}" srcId="{68B5F292-5E35-4807-B0F6-8B4EC59225E7}" destId="{DCA9DA11-8F69-4C58-AE45-67A4935D4FE3}" srcOrd="1" destOrd="0" parTransId="{9206E045-C31D-42F8-BD2E-812382B47A89}" sibTransId="{B1641056-6AF7-41A8-9878-2B22233EFC3F}"/>
-    <dgm:cxn modelId="{F584F123-61AA-4E60-AEA3-F0B57B902BA0}" type="presOf" srcId="{025226CC-EFBC-4D7D-8694-87C9BBDD6F61}" destId="{76C443C6-C06D-49EC-9ADC-FCEEB6885D82}" srcOrd="0" destOrd="0" presId="urn:microsoft.com/office/officeart/2005/8/layout/hierarchy4"/>
-    <dgm:cxn modelId="{C2969C60-DEC7-4FAF-81ED-A8CFA583C032}" srcId="{FB641364-DD55-4651-87F1-17577D60BCEE}" destId="{B01411C6-06C6-4919-9106-2DDDADD784BB}" srcOrd="0" destOrd="0" parTransId="{B2B1A4E5-8551-40E5-8F58-04FEEFFDED41}" sibTransId="{94BDD0E0-20AC-46E9-896A-0E671C5DFE16}"/>
-    <dgm:cxn modelId="{25A13A1E-12A0-4732-98FD-37EEFCD14ECF}" type="presOf" srcId="{7939B98A-7D1A-4C5D-8E77-80D62ED57131}" destId="{3535F8EB-B400-455A-ADBE-F075582911E2}" srcOrd="0" destOrd="0" presId="urn:microsoft.com/office/officeart/2005/8/layout/hierarchy4"/>
-    <dgm:cxn modelId="{F791BAEE-BF0F-4734-B299-89A363CEDA1A}" type="presOf" srcId="{E79FA759-841C-4396-91D9-F0DA650FC191}" destId="{E45DF21C-76A2-4286-90FB-3ED927B51613}" srcOrd="0" destOrd="0" presId="urn:microsoft.com/office/officeart/2005/8/layout/hierarchy4"/>
     <dgm:cxn modelId="{EF33C93D-DE43-42AE-875A-258CAA2A36F8}" srcId="{FB641364-DD55-4651-87F1-17577D60BCEE}" destId="{7939B98A-7D1A-4C5D-8E77-80D62ED57131}" srcOrd="1" destOrd="0" parTransId="{9F1F0349-96A9-43E3-83FA-C02923721DE9}" sibTransId="{82AF7DB8-B62F-464B-9435-445F0717E441}"/>
-    <dgm:cxn modelId="{1E7FF234-FDEF-4B01-8B3E-B7FB1D1ABDAE}" type="presOf" srcId="{68B5F292-5E35-4807-B0F6-8B4EC59225E7}" destId="{5F7E5708-2772-437B-ADA7-736FAAAC2B8A}" srcOrd="0" destOrd="0" presId="urn:microsoft.com/office/officeart/2005/8/layout/hierarchy4"/>
-    <dgm:cxn modelId="{448F758A-12AD-4B4C-9838-8812AB6530C6}" srcId="{DCA9DA11-8F69-4C58-AE45-67A4935D4FE3}" destId="{1EAF6AC1-C035-46DC-A312-61B7B1733DDA}" srcOrd="0" destOrd="0" parTransId="{42F8A224-8791-402C-A685-225A22F63571}" sibTransId="{067ABEBF-4CA5-41A7-AFFD-7BA60B698E80}"/>
-    <dgm:cxn modelId="{57E3337A-0F6F-4438-82FA-D0600EE23412}" type="presOf" srcId="{B7547AB6-4DBC-4F6E-9175-94419C59A753}" destId="{65BB2561-1BFB-4282-9B48-E6B15BBE6760}" srcOrd="0" destOrd="0" presId="urn:microsoft.com/office/officeart/2005/8/layout/hierarchy4"/>
     <dgm:cxn modelId="{27D7E6CB-3D7E-4642-B3FF-F061E0363DE5}" type="presParOf" srcId="{76C443C6-C06D-49EC-9ADC-FCEEB6885D82}" destId="{51ADC297-A54A-4A0B-B8ED-E64A7BB84014}" srcOrd="0" destOrd="0" presId="urn:microsoft.com/office/officeart/2005/8/layout/hierarchy4"/>
     <dgm:cxn modelId="{E6C2E458-9258-4EBB-B032-550ECED03517}" type="presParOf" srcId="{51ADC297-A54A-4A0B-B8ED-E64A7BB84014}" destId="{5F7E5708-2772-437B-ADA7-736FAAAC2B8A}" srcOrd="0" destOrd="0" presId="urn:microsoft.com/office/officeart/2005/8/layout/hierarchy4"/>
     <dgm:cxn modelId="{4B480AB2-AE73-427F-A178-AE9EF788609E}" type="presParOf" srcId="{51ADC297-A54A-4A0B-B8ED-E64A7BB84014}" destId="{45E84B0D-AF52-4EB6-87C6-DED239B64A2C}" srcOrd="1" destOrd="0" presId="urn:microsoft.com/office/officeart/2005/8/layout/hierarchy4"/>
@@ -8805,7 +8793,7 @@
   <dgm:whole/>
   <dgm:extLst>
     <a:ext uri="http://schemas.microsoft.com/office/drawing/2008/diagram">
-      <dsp:dataModelExt xmlns:dsp="http://schemas.microsoft.com/office/drawing/2008/diagram" xmlns="" relId="rId6" minVer="http://schemas.openxmlformats.org/drawingml/2006/diagram"/>
+      <dsp:dataModelExt xmlns:dsp="http://schemas.microsoft.com/office/drawing/2008/diagram" relId="rId6" minVer="http://schemas.openxmlformats.org/drawingml/2006/diagram"/>
     </a:ext>
   </dgm:extLst>
 </dgm:dataModel>
@@ -9495,25 +9483,25 @@
     </dgm:pt>
   </dgm:ptLst>
   <dgm:cxnLst>
+    <dgm:cxn modelId="{09C2DE89-4F2F-4809-AA9C-BA32B9E5335C}" srcId="{68B5F292-5E35-4807-B0F6-8B4EC59225E7}" destId="{E79FA759-841C-4396-91D9-F0DA650FC191}" srcOrd="2" destOrd="0" parTransId="{85A6443E-FEC8-4418-9206-C301A1573CDF}" sibTransId="{A90A644D-D7C2-49F6-9F48-CB59377E40A9}"/>
+    <dgm:cxn modelId="{3BEF3040-EB65-4E85-8A28-23F0858F3B99}" type="presOf" srcId="{DCA9DA11-8F69-4C58-AE45-67A4935D4FE3}" destId="{EBDEC654-6A69-4DB1-9502-97225948F683}" srcOrd="0" destOrd="0" presId="urn:microsoft.com/office/officeart/2005/8/layout/hierarchy4"/>
+    <dgm:cxn modelId="{39A93F89-827C-41A4-8E25-0BDD819835AF}" srcId="{68B5F292-5E35-4807-B0F6-8B4EC59225E7}" destId="{FB641364-DD55-4651-87F1-17577D60BCEE}" srcOrd="0" destOrd="0" parTransId="{C1FA6D31-5666-4107-A56D-03BC07243C56}" sibTransId="{045FBE24-21AF-480B-B400-189D6DCFD281}"/>
+    <dgm:cxn modelId="{C7A719B1-46A2-4575-AE88-5E6C6C736A1A}" type="presOf" srcId="{E79FA759-841C-4396-91D9-F0DA650FC191}" destId="{E45DF21C-76A2-4286-90FB-3ED927B51613}" srcOrd="0" destOrd="0" presId="urn:microsoft.com/office/officeart/2005/8/layout/hierarchy4"/>
+    <dgm:cxn modelId="{49F95719-6438-439E-9C73-35DBFBA625C4}" type="presOf" srcId="{7939B98A-7D1A-4C5D-8E77-80D62ED57131}" destId="{3535F8EB-B400-455A-ADBE-F075582911E2}" srcOrd="0" destOrd="0" presId="urn:microsoft.com/office/officeart/2005/8/layout/hierarchy4"/>
+    <dgm:cxn modelId="{0B04219C-43EF-4274-AD31-47262CE7BE69}" type="presOf" srcId="{FB641364-DD55-4651-87F1-17577D60BCEE}" destId="{7DF13B49-2E20-44FB-8E6A-FB065603BD36}" srcOrd="0" destOrd="0" presId="urn:microsoft.com/office/officeart/2005/8/layout/hierarchy4"/>
+    <dgm:cxn modelId="{448F758A-12AD-4B4C-9838-8812AB6530C6}" srcId="{DCA9DA11-8F69-4C58-AE45-67A4935D4FE3}" destId="{1EAF6AC1-C035-46DC-A312-61B7B1733DDA}" srcOrd="0" destOrd="0" parTransId="{42F8A224-8791-402C-A685-225A22F63571}" sibTransId="{067ABEBF-4CA5-41A7-AFFD-7BA60B698E80}"/>
+    <dgm:cxn modelId="{ADDB1EAB-2482-4A15-8B77-75C9D9FA2DEE}" type="presOf" srcId="{B01411C6-06C6-4919-9106-2DDDADD784BB}" destId="{650A12E1-8522-4D05-AA2C-4ECA0A47E3FB}" srcOrd="0" destOrd="0" presId="urn:microsoft.com/office/officeart/2005/8/layout/hierarchy4"/>
+    <dgm:cxn modelId="{D0A9E060-3DFA-43F8-AD82-84477C231D8A}" type="presOf" srcId="{1EAF6AC1-C035-46DC-A312-61B7B1733DDA}" destId="{E1474752-7981-453A-8AC9-D4BC3EC1A35A}" srcOrd="0" destOrd="0" presId="urn:microsoft.com/office/officeart/2005/8/layout/hierarchy4"/>
     <dgm:cxn modelId="{C8B6E1F9-ABAD-4035-8DCA-2C37759A8F13}" srcId="{DCA9DA11-8F69-4C58-AE45-67A4935D4FE3}" destId="{B7547AB6-4DBC-4F6E-9175-94419C59A753}" srcOrd="1" destOrd="0" parTransId="{E40C287B-2DF5-48EA-89F8-913044C4EBFC}" sibTransId="{D7BD941F-7FD7-47D1-98A8-C68CBEC79658}"/>
+    <dgm:cxn modelId="{07A2A366-4B48-4040-BF28-88750C669AED}" srcId="{68B5F292-5E35-4807-B0F6-8B4EC59225E7}" destId="{DCA9DA11-8F69-4C58-AE45-67A4935D4FE3}" srcOrd="1" destOrd="0" parTransId="{9206E045-C31D-42F8-BD2E-812382B47A89}" sibTransId="{B1641056-6AF7-41A8-9878-2B22233EFC3F}"/>
+    <dgm:cxn modelId="{4DD11BD1-2AED-4AB4-A85E-FCECEF8A2319}" type="presOf" srcId="{B7547AB6-4DBC-4F6E-9175-94419C59A753}" destId="{65BB2561-1BFB-4282-9B48-E6B15BBE6760}" srcOrd="0" destOrd="0" presId="urn:microsoft.com/office/officeart/2005/8/layout/hierarchy4"/>
+    <dgm:cxn modelId="{AD953DDA-C3A4-4F9A-800F-1383BC382BCA}" srcId="{025226CC-EFBC-4D7D-8694-87C9BBDD6F61}" destId="{68B5F292-5E35-4807-B0F6-8B4EC59225E7}" srcOrd="0" destOrd="0" parTransId="{BDA1E3DA-16B6-4AF4-B1F2-D40698D1F65A}" sibTransId="{C49BB10B-421F-4066-AE04-BDE2F62714C9}"/>
+    <dgm:cxn modelId="{2D4F1182-A278-4C18-B26C-BB8B742F6D6F}" type="presOf" srcId="{025226CC-EFBC-4D7D-8694-87C9BBDD6F61}" destId="{76C443C6-C06D-49EC-9ADC-FCEEB6885D82}" srcOrd="0" destOrd="0" presId="urn:microsoft.com/office/officeart/2005/8/layout/hierarchy4"/>
+    <dgm:cxn modelId="{24A9B2A4-98AD-4FE6-AE07-B763169A4B34}" type="presOf" srcId="{68B5F292-5E35-4807-B0F6-8B4EC59225E7}" destId="{5F7E5708-2772-437B-ADA7-736FAAAC2B8A}" srcOrd="0" destOrd="0" presId="urn:microsoft.com/office/officeart/2005/8/layout/hierarchy4"/>
     <dgm:cxn modelId="{B02E7494-5315-450E-B3B3-2925F91CC108}" srcId="{FB641364-DD55-4651-87F1-17577D60BCEE}" destId="{8A68058C-AC41-4F37-853A-753F6B953DD3}" srcOrd="2" destOrd="0" parTransId="{63BCE89E-7599-48E7-B8F1-ED58A12D724D}" sibTransId="{36ADCED1-2366-48BC-B601-D15FEDE44EB3}"/>
-    <dgm:cxn modelId="{AD953DDA-C3A4-4F9A-800F-1383BC382BCA}" srcId="{025226CC-EFBC-4D7D-8694-87C9BBDD6F61}" destId="{68B5F292-5E35-4807-B0F6-8B4EC59225E7}" srcOrd="0" destOrd="0" parTransId="{BDA1E3DA-16B6-4AF4-B1F2-D40698D1F65A}" sibTransId="{C49BB10B-421F-4066-AE04-BDE2F62714C9}"/>
-    <dgm:cxn modelId="{09C2DE89-4F2F-4809-AA9C-BA32B9E5335C}" srcId="{68B5F292-5E35-4807-B0F6-8B4EC59225E7}" destId="{E79FA759-841C-4396-91D9-F0DA650FC191}" srcOrd="2" destOrd="0" parTransId="{85A6443E-FEC8-4418-9206-C301A1573CDF}" sibTransId="{A90A644D-D7C2-49F6-9F48-CB59377E40A9}"/>
-    <dgm:cxn modelId="{24A9B2A4-98AD-4FE6-AE07-B763169A4B34}" type="presOf" srcId="{68B5F292-5E35-4807-B0F6-8B4EC59225E7}" destId="{5F7E5708-2772-437B-ADA7-736FAAAC2B8A}" srcOrd="0" destOrd="0" presId="urn:microsoft.com/office/officeart/2005/8/layout/hierarchy4"/>
-    <dgm:cxn modelId="{39A93F89-827C-41A4-8E25-0BDD819835AF}" srcId="{68B5F292-5E35-4807-B0F6-8B4EC59225E7}" destId="{FB641364-DD55-4651-87F1-17577D60BCEE}" srcOrd="0" destOrd="0" parTransId="{C1FA6D31-5666-4107-A56D-03BC07243C56}" sibTransId="{045FBE24-21AF-480B-B400-189D6DCFD281}"/>
-    <dgm:cxn modelId="{2D4F1182-A278-4C18-B26C-BB8B742F6D6F}" type="presOf" srcId="{025226CC-EFBC-4D7D-8694-87C9BBDD6F61}" destId="{76C443C6-C06D-49EC-9ADC-FCEEB6885D82}" srcOrd="0" destOrd="0" presId="urn:microsoft.com/office/officeart/2005/8/layout/hierarchy4"/>
-    <dgm:cxn modelId="{4DD11BD1-2AED-4AB4-A85E-FCECEF8A2319}" type="presOf" srcId="{B7547AB6-4DBC-4F6E-9175-94419C59A753}" destId="{65BB2561-1BFB-4282-9B48-E6B15BBE6760}" srcOrd="0" destOrd="0" presId="urn:microsoft.com/office/officeart/2005/8/layout/hierarchy4"/>
+    <dgm:cxn modelId="{C2969C60-DEC7-4FAF-81ED-A8CFA583C032}" srcId="{FB641364-DD55-4651-87F1-17577D60BCEE}" destId="{B01411C6-06C6-4919-9106-2DDDADD784BB}" srcOrd="0" destOrd="0" parTransId="{B2B1A4E5-8551-40E5-8F58-04FEEFFDED41}" sibTransId="{94BDD0E0-20AC-46E9-896A-0E671C5DFE16}"/>
+    <dgm:cxn modelId="{EF33C93D-DE43-42AE-875A-258CAA2A36F8}" srcId="{FB641364-DD55-4651-87F1-17577D60BCEE}" destId="{7939B98A-7D1A-4C5D-8E77-80D62ED57131}" srcOrd="1" destOrd="0" parTransId="{9F1F0349-96A9-43E3-83FA-C02923721DE9}" sibTransId="{82AF7DB8-B62F-464B-9435-445F0717E441}"/>
     <dgm:cxn modelId="{A7A4C6C3-1D63-4521-8BC3-DED8C6C83758}" type="presOf" srcId="{8A68058C-AC41-4F37-853A-753F6B953DD3}" destId="{C338C36F-0FC5-434E-BEB0-F2C582011F19}" srcOrd="0" destOrd="0" presId="urn:microsoft.com/office/officeart/2005/8/layout/hierarchy4"/>
-    <dgm:cxn modelId="{49F95719-6438-439E-9C73-35DBFBA625C4}" type="presOf" srcId="{7939B98A-7D1A-4C5D-8E77-80D62ED57131}" destId="{3535F8EB-B400-455A-ADBE-F075582911E2}" srcOrd="0" destOrd="0" presId="urn:microsoft.com/office/officeart/2005/8/layout/hierarchy4"/>
-    <dgm:cxn modelId="{07A2A366-4B48-4040-BF28-88750C669AED}" srcId="{68B5F292-5E35-4807-B0F6-8B4EC59225E7}" destId="{DCA9DA11-8F69-4C58-AE45-67A4935D4FE3}" srcOrd="1" destOrd="0" parTransId="{9206E045-C31D-42F8-BD2E-812382B47A89}" sibTransId="{B1641056-6AF7-41A8-9878-2B22233EFC3F}"/>
-    <dgm:cxn modelId="{ADDB1EAB-2482-4A15-8B77-75C9D9FA2DEE}" type="presOf" srcId="{B01411C6-06C6-4919-9106-2DDDADD784BB}" destId="{650A12E1-8522-4D05-AA2C-4ECA0A47E3FB}" srcOrd="0" destOrd="0" presId="urn:microsoft.com/office/officeart/2005/8/layout/hierarchy4"/>
-    <dgm:cxn modelId="{0B04219C-43EF-4274-AD31-47262CE7BE69}" type="presOf" srcId="{FB641364-DD55-4651-87F1-17577D60BCEE}" destId="{7DF13B49-2E20-44FB-8E6A-FB065603BD36}" srcOrd="0" destOrd="0" presId="urn:microsoft.com/office/officeart/2005/8/layout/hierarchy4"/>
-    <dgm:cxn modelId="{C2969C60-DEC7-4FAF-81ED-A8CFA583C032}" srcId="{FB641364-DD55-4651-87F1-17577D60BCEE}" destId="{B01411C6-06C6-4919-9106-2DDDADD784BB}" srcOrd="0" destOrd="0" parTransId="{B2B1A4E5-8551-40E5-8F58-04FEEFFDED41}" sibTransId="{94BDD0E0-20AC-46E9-896A-0E671C5DFE16}"/>
-    <dgm:cxn modelId="{3BEF3040-EB65-4E85-8A28-23F0858F3B99}" type="presOf" srcId="{DCA9DA11-8F69-4C58-AE45-67A4935D4FE3}" destId="{EBDEC654-6A69-4DB1-9502-97225948F683}" srcOrd="0" destOrd="0" presId="urn:microsoft.com/office/officeart/2005/8/layout/hierarchy4"/>
-    <dgm:cxn modelId="{EF33C93D-DE43-42AE-875A-258CAA2A36F8}" srcId="{FB641364-DD55-4651-87F1-17577D60BCEE}" destId="{7939B98A-7D1A-4C5D-8E77-80D62ED57131}" srcOrd="1" destOrd="0" parTransId="{9F1F0349-96A9-43E3-83FA-C02923721DE9}" sibTransId="{82AF7DB8-B62F-464B-9435-445F0717E441}"/>
-    <dgm:cxn modelId="{D0A9E060-3DFA-43F8-AD82-84477C231D8A}" type="presOf" srcId="{1EAF6AC1-C035-46DC-A312-61B7B1733DDA}" destId="{E1474752-7981-453A-8AC9-D4BC3EC1A35A}" srcOrd="0" destOrd="0" presId="urn:microsoft.com/office/officeart/2005/8/layout/hierarchy4"/>
-    <dgm:cxn modelId="{C7A719B1-46A2-4575-AE88-5E6C6C736A1A}" type="presOf" srcId="{E79FA759-841C-4396-91D9-F0DA650FC191}" destId="{E45DF21C-76A2-4286-90FB-3ED927B51613}" srcOrd="0" destOrd="0" presId="urn:microsoft.com/office/officeart/2005/8/layout/hierarchy4"/>
-    <dgm:cxn modelId="{448F758A-12AD-4B4C-9838-8812AB6530C6}" srcId="{DCA9DA11-8F69-4C58-AE45-67A4935D4FE3}" destId="{1EAF6AC1-C035-46DC-A312-61B7B1733DDA}" srcOrd="0" destOrd="0" parTransId="{42F8A224-8791-402C-A685-225A22F63571}" sibTransId="{067ABEBF-4CA5-41A7-AFFD-7BA60B698E80}"/>
     <dgm:cxn modelId="{AC125823-3F8B-4042-AAF5-CF213E0F3399}" type="presParOf" srcId="{76C443C6-C06D-49EC-9ADC-FCEEB6885D82}" destId="{51ADC297-A54A-4A0B-B8ED-E64A7BB84014}" srcOrd="0" destOrd="0" presId="urn:microsoft.com/office/officeart/2005/8/layout/hierarchy4"/>
     <dgm:cxn modelId="{CCAC7AB7-705C-4F11-8F4E-2D886FBCE22C}" type="presParOf" srcId="{51ADC297-A54A-4A0B-B8ED-E64A7BB84014}" destId="{5F7E5708-2772-437B-ADA7-736FAAAC2B8A}" srcOrd="0" destOrd="0" presId="urn:microsoft.com/office/officeart/2005/8/layout/hierarchy4"/>
     <dgm:cxn modelId="{B7F95807-B0E2-4BF3-9DB4-509BF9352D89}" type="presParOf" srcId="{51ADC297-A54A-4A0B-B8ED-E64A7BB84014}" destId="{45E84B0D-AF52-4EB6-87C6-DED239B64A2C}" srcOrd="1" destOrd="0" presId="urn:microsoft.com/office/officeart/2005/8/layout/hierarchy4"/>
@@ -9556,14 +9544,14 @@
   <dgm:whole/>
   <dgm:extLst>
     <a:ext uri="http://schemas.microsoft.com/office/drawing/2008/diagram">
-      <dsp:dataModelExt xmlns:dsp="http://schemas.microsoft.com/office/drawing/2008/diagram" xmlns="" relId="rId6" minVer="http://schemas.openxmlformats.org/drawingml/2006/diagram"/>
+      <dsp:dataModelExt xmlns:dsp="http://schemas.microsoft.com/office/drawing/2008/diagram" relId="rId6" minVer="http://schemas.openxmlformats.org/drawingml/2006/diagram"/>
     </a:ext>
   </dgm:extLst>
 </dgm:dataModel>
 </file>
 
 <file path=ppt/diagrams/drawing1.xml><?xml version="1.0" encoding="utf-8"?>
-<dsp:drawing xmlns:dgm="http://schemas.openxmlformats.org/drawingml/2006/diagram" xmlns:a="http://schemas.openxmlformats.org/drawingml/2006/main" xmlns:dsp="http://schemas.microsoft.com/office/drawing/2008/diagram">
+<dsp:drawing xmlns:dgm="http://schemas.openxmlformats.org/drawingml/2006/diagram" xmlns:dsp="http://schemas.microsoft.com/office/drawing/2008/diagram" xmlns:a="http://schemas.openxmlformats.org/drawingml/2006/main">
   <dsp:spTree>
     <dsp:nvGrpSpPr>
       <dsp:cNvPr id="0" name=""/>
@@ -9623,14 +9611,10 @@
             </a:spcAft>
           </a:pPr>
           <a:r>
-            <a:rPr lang="de-DE" sz="1800" kern="1200" smtClean="0"/>
-            <a:t>Freitag, </a:t>
+            <a:rPr lang="de-DE" sz="1800" kern="1200" dirty="0" smtClean="0"/>
+            <a:t>Freitag, 15.10.10</a:t>
           </a:r>
-          <a:r>
-            <a:rPr lang="de-DE" sz="1800" kern="1200" smtClean="0"/>
-            <a:t>16.10.09</a:t>
-          </a:r>
-          <a:endParaRPr lang="de-DE" sz="1800" kern="1200"/>
+          <a:endParaRPr lang="de-DE" sz="1800" kern="1200" dirty="0"/>
         </a:p>
       </dsp:txBody>
       <dsp:txXfrm>
@@ -9695,8 +9679,8 @@
         </a:p>
       </dsp:txBody>
       <dsp:txXfrm>
-        <a:off x="128596" y="784223"/>
-        <a:ext cx="1024828" cy="440426"/>
+        <a:off x="141496" y="797123"/>
+        <a:ext cx="999028" cy="414626"/>
       </dsp:txXfrm>
     </dsp:sp>
     <dsp:sp modelId="{5D8121ED-D8FD-49F9-B686-535A2310F5D6}">
@@ -9756,8 +9740,8 @@
         </a:p>
       </dsp:txBody>
       <dsp:txXfrm>
-        <a:off x="128596" y="1292408"/>
-        <a:ext cx="1024828" cy="440426"/>
+        <a:off x="141496" y="1305308"/>
+        <a:ext cx="999028" cy="414626"/>
       </dsp:txXfrm>
     </dsp:sp>
     <dsp:sp modelId="{10EE4289-6B83-429C-AB6C-E3932732733F}">
@@ -9823,15 +9807,15 @@
             </a:spcAft>
           </a:pPr>
           <a:r>
-            <a:rPr lang="de-DE" sz="1200" kern="1200" smtClean="0"/>
-            <a:t>19 Uhr Kennenlernen</a:t>
+            <a:rPr lang="de-DE" sz="1200" kern="1200" dirty="0" smtClean="0"/>
+            <a:t>ab 19 Uhr Kennenlernen</a:t>
           </a:r>
-          <a:endParaRPr lang="de-DE" sz="1200" kern="1200"/>
+          <a:endParaRPr lang="de-DE" sz="1200" kern="1200" dirty="0"/>
         </a:p>
       </dsp:txBody>
       <dsp:txXfrm>
-        <a:off x="128596" y="1682058"/>
-        <a:ext cx="1024828" cy="701397"/>
+        <a:off x="149139" y="1702601"/>
+        <a:ext cx="983742" cy="660311"/>
       </dsp:txXfrm>
     </dsp:sp>
     <dsp:sp modelId="{5324F7ED-3B45-4070-BCF1-63E4FAA33219}">
@@ -9887,14 +9871,10 @@
             </a:spcAft>
           </a:pPr>
           <a:r>
-            <a:rPr lang="de-DE" sz="1800" kern="1200" smtClean="0"/>
-            <a:t>Samstag, </a:t>
+            <a:rPr lang="de-DE" sz="1800" kern="1200" dirty="0" smtClean="0"/>
+            <a:t>Samstag, 16.10.10</a:t>
           </a:r>
-          <a:r>
-            <a:rPr lang="de-DE" sz="1800" kern="1200" smtClean="0"/>
-            <a:t>17.10.09</a:t>
-          </a:r>
-          <a:endParaRPr lang="de-DE" sz="1800" kern="1200"/>
+          <a:endParaRPr lang="de-DE" sz="1800" kern="1200" dirty="0"/>
         </a:p>
       </dsp:txBody>
       <dsp:txXfrm>
@@ -9959,8 +9939,8 @@
         </a:p>
       </dsp:txBody>
       <dsp:txXfrm>
-        <a:off x="1505709" y="792966"/>
-        <a:ext cx="1024828" cy="100594"/>
+        <a:off x="1508655" y="795912"/>
+        <a:ext cx="1018936" cy="94702"/>
       </dsp:txXfrm>
     </dsp:sp>
     <dsp:sp modelId="{07143B47-B337-4D7B-956E-8A5174C66416}">
@@ -10026,22 +10006,22 @@
             </a:spcAft>
           </a:pPr>
           <a:r>
-            <a:rPr lang="de-DE" sz="1200" kern="1200" smtClean="0"/>
+            <a:rPr lang="de-DE" sz="1200" kern="1200" dirty="0" smtClean="0"/>
             <a:t>8 Uhr</a:t>
           </a:r>
           <a:br>
-            <a:rPr lang="de-DE" sz="1200" kern="1200" smtClean="0"/>
+            <a:rPr lang="de-DE" sz="1200" kern="1200" dirty="0" smtClean="0"/>
           </a:br>
           <a:r>
-            <a:rPr lang="de-DE" sz="1200" kern="1200" smtClean="0"/>
+            <a:rPr lang="de-DE" sz="1200" kern="1200" dirty="0" smtClean="0"/>
             <a:t>Smalltalk</a:t>
           </a:r>
-          <a:endParaRPr lang="de-DE" sz="1200" kern="1200"/>
+          <a:endParaRPr lang="de-DE" sz="1200" kern="1200" dirty="0"/>
         </a:p>
       </dsp:txBody>
       <dsp:txXfrm>
-        <a:off x="1505709" y="830250"/>
-        <a:ext cx="1024828" cy="467271"/>
+        <a:off x="1519395" y="843936"/>
+        <a:ext cx="997456" cy="439899"/>
       </dsp:txXfrm>
     </dsp:sp>
     <dsp:sp modelId="{9B0F7344-B2D3-4F1F-B219-D92C92A21897}">
@@ -10107,26 +10087,26 @@
             </a:spcAft>
           </a:pPr>
           <a:r>
-            <a:rPr lang="de-DE" sz="1200" kern="1200" smtClean="0"/>
-            <a:t>9 – 19 Uhr</a:t>
+            <a:rPr lang="de-DE" sz="1200" kern="1200" dirty="0" smtClean="0"/>
+            <a:t>10 </a:t>
+          </a:r>
+          <a:r>
+            <a:rPr lang="de-DE" sz="1200" kern="1200" dirty="0" smtClean="0"/>
+            <a:t>– 19 Uhr</a:t>
           </a:r>
           <a:br>
-            <a:rPr lang="de-DE" sz="1200" kern="1200" smtClean="0"/>
+            <a:rPr lang="de-DE" sz="1200" kern="1200" dirty="0" smtClean="0"/>
           </a:br>
           <a:r>
-            <a:rPr lang="de-DE" sz="1200" kern="1200" smtClean="0"/>
-            <a:t>Open </a:t>
+            <a:rPr lang="de-DE" sz="1200" kern="1200" dirty="0" smtClean="0"/>
+            <a:t>Open Spaces</a:t>
           </a:r>
-          <a:r>
-            <a:rPr lang="de-DE" sz="1200" kern="1200" err="1" smtClean="0"/>
-            <a:t>Spaces</a:t>
-          </a:r>
-          <a:endParaRPr lang="de-DE" sz="1200" kern="1200"/>
+          <a:endParaRPr lang="de-DE" sz="1200" kern="1200" dirty="0"/>
         </a:p>
       </dsp:txBody>
       <dsp:txXfrm>
-        <a:off x="1505709" y="1369410"/>
-        <a:ext cx="1024828" cy="467271"/>
+        <a:off x="1519395" y="1383096"/>
+        <a:ext cx="997456" cy="439899"/>
       </dsp:txXfrm>
     </dsp:sp>
     <dsp:sp modelId="{4BDE38F7-DA67-42D3-8710-F7C774BDD06B}">
@@ -10206,8 +10186,8 @@
         </a:p>
       </dsp:txBody>
       <dsp:txXfrm>
-        <a:off x="1505709" y="1908570"/>
-        <a:ext cx="1024828" cy="467271"/>
+        <a:off x="1519395" y="1922256"/>
+        <a:ext cx="997456" cy="439899"/>
       </dsp:txXfrm>
     </dsp:sp>
     <dsp:sp modelId="{C49EA062-A2A5-4158-904E-5945C6086208}">
@@ -10263,14 +10243,10 @@
             </a:spcAft>
           </a:pPr>
           <a:r>
-            <a:rPr lang="de-DE" sz="1800" kern="1200" smtClean="0"/>
-            <a:t>Sonntag, </a:t>
+            <a:rPr lang="de-DE" sz="1800" kern="1200" dirty="0" smtClean="0"/>
+            <a:t>Sonntag, 17.10.10</a:t>
           </a:r>
-          <a:r>
-            <a:rPr lang="de-DE" sz="1800" kern="1200" smtClean="0"/>
-            <a:t>18.10.09</a:t>
-          </a:r>
-          <a:endParaRPr lang="de-DE" sz="1800" kern="1200"/>
+          <a:endParaRPr lang="de-DE" sz="1800" kern="1200" dirty="0"/>
         </a:p>
       </dsp:txBody>
       <dsp:txXfrm>
@@ -10335,8 +10311,8 @@
         </a:p>
       </dsp:txBody>
       <dsp:txXfrm>
-        <a:off x="2882822" y="792966"/>
-        <a:ext cx="1024828" cy="100594"/>
+        <a:off x="2885768" y="795912"/>
+        <a:ext cx="1018936" cy="94702"/>
       </dsp:txXfrm>
     </dsp:sp>
     <dsp:sp modelId="{6A6EFDF1-527A-4470-8A8C-D4C0F52C28A7}">
@@ -10416,8 +10392,8 @@
         </a:p>
       </dsp:txBody>
       <dsp:txXfrm>
-        <a:off x="2882822" y="830250"/>
-        <a:ext cx="1024828" cy="467271"/>
+        <a:off x="2896508" y="843936"/>
+        <a:ext cx="997456" cy="439899"/>
       </dsp:txXfrm>
     </dsp:sp>
     <dsp:sp modelId="{562C62FE-E524-4854-AA9A-CEDFDE8E5818}">
@@ -10483,22 +10459,34 @@
             </a:spcAft>
           </a:pPr>
           <a:r>
-            <a:rPr lang="de-DE" sz="1200" kern="1200" smtClean="0"/>
-            <a:t>9 – 19 Uhr</a:t>
+            <a:rPr lang="de-DE" sz="1200" kern="1200" dirty="0" smtClean="0"/>
+            <a:t>10 </a:t>
+          </a:r>
+          <a:r>
+            <a:rPr lang="de-DE" sz="1200" kern="1200" dirty="0" smtClean="0"/>
+            <a:t>– </a:t>
+          </a:r>
+          <a:r>
+            <a:rPr lang="de-DE" sz="1200" kern="1200" dirty="0" smtClean="0"/>
+            <a:t>18 </a:t>
+          </a:r>
+          <a:r>
+            <a:rPr lang="de-DE" sz="1200" kern="1200" dirty="0" smtClean="0"/>
+            <a:t>Uhr</a:t>
           </a:r>
           <a:br>
-            <a:rPr lang="de-DE" sz="1200" kern="1200" smtClean="0"/>
+            <a:rPr lang="de-DE" sz="1200" kern="1200" dirty="0" smtClean="0"/>
           </a:br>
           <a:r>
-            <a:rPr lang="de-DE" sz="1200" kern="1200" smtClean="0"/>
+            <a:rPr lang="de-DE" sz="1200" kern="1200" dirty="0" smtClean="0"/>
             <a:t>Open Spaces</a:t>
           </a:r>
-          <a:endParaRPr lang="de-DE" sz="1200" kern="1200"/>
+          <a:endParaRPr lang="de-DE" sz="1200" kern="1200" dirty="0"/>
         </a:p>
       </dsp:txBody>
       <dsp:txXfrm>
-        <a:off x="2882822" y="1369410"/>
-        <a:ext cx="1024828" cy="467271"/>
+        <a:off x="2896508" y="1383096"/>
+        <a:ext cx="997456" cy="439899"/>
       </dsp:txXfrm>
     </dsp:sp>
     <dsp:sp modelId="{75473608-B74A-4E5F-B24F-6601E0D58C72}">
@@ -10558,8 +10546,8 @@
         </a:p>
       </dsp:txBody>
       <dsp:txXfrm>
-        <a:off x="2882822" y="2034329"/>
-        <a:ext cx="1024828" cy="467271"/>
+        <a:off x="2896508" y="2048015"/>
+        <a:ext cx="997456" cy="439899"/>
       </dsp:txXfrm>
     </dsp:sp>
   </dsp:spTree>
@@ -10567,7 +10555,7 @@
 </file>
 
 <file path=ppt/diagrams/drawing2.xml><?xml version="1.0" encoding="utf-8"?>
-<dsp:drawing xmlns:dgm="http://schemas.openxmlformats.org/drawingml/2006/diagram" xmlns:a="http://schemas.openxmlformats.org/drawingml/2006/main" xmlns:dsp="http://schemas.microsoft.com/office/drawing/2008/diagram">
+<dsp:drawing xmlns:dgm="http://schemas.openxmlformats.org/drawingml/2006/diagram" xmlns:dsp="http://schemas.microsoft.com/office/drawing/2008/diagram" xmlns:a="http://schemas.openxmlformats.org/drawingml/2006/main">
   <dsp:spTree>
     <dsp:nvGrpSpPr>
       <dsp:cNvPr id="0" name=""/>
@@ -10628,11 +10616,7 @@
           </a:pPr>
           <a:r>
             <a:rPr lang="de-DE" sz="1800" kern="1200" smtClean="0"/>
-            <a:t>Friday, </a:t>
-          </a:r>
-          <a:r>
-            <a:rPr lang="de-DE" sz="1800" kern="1200" smtClean="0"/>
-            <a:t>10/16/09</a:t>
+            <a:t>Friday, 10/16/09</a:t>
           </a:r>
           <a:endParaRPr lang="de-DE" sz="1800" kern="1200"/>
         </a:p>
@@ -10699,8 +10683,8 @@
         </a:p>
       </dsp:txBody>
       <dsp:txXfrm>
-        <a:off x="128596" y="784223"/>
-        <a:ext cx="1024828" cy="440426"/>
+        <a:off x="141496" y="797123"/>
+        <a:ext cx="999028" cy="414626"/>
       </dsp:txXfrm>
     </dsp:sp>
     <dsp:sp modelId="{5D8121ED-D8FD-49F9-B686-535A2310F5D6}">
@@ -10760,8 +10744,8 @@
         </a:p>
       </dsp:txBody>
       <dsp:txXfrm>
-        <a:off x="128596" y="1292408"/>
-        <a:ext cx="1024828" cy="440426"/>
+        <a:off x="141496" y="1305308"/>
+        <a:ext cx="999028" cy="414626"/>
       </dsp:txXfrm>
     </dsp:sp>
     <dsp:sp modelId="{10EE4289-6B83-429C-AB6C-E3932732733F}">
@@ -10845,8 +10829,8 @@
         </a:p>
       </dsp:txBody>
       <dsp:txXfrm>
-        <a:off x="128596" y="1682058"/>
-        <a:ext cx="1024828" cy="701397"/>
+        <a:off x="149139" y="1702601"/>
+        <a:ext cx="983742" cy="660311"/>
       </dsp:txXfrm>
     </dsp:sp>
     <dsp:sp modelId="{5324F7ED-3B45-4070-BCF1-63E4FAA33219}">
@@ -10903,11 +10887,7 @@
           </a:pPr>
           <a:r>
             <a:rPr lang="de-DE" sz="1800" kern="1200" smtClean="0"/>
-            <a:t>Saturday, </a:t>
-          </a:r>
-          <a:r>
-            <a:rPr lang="de-DE" sz="1800" kern="1200" smtClean="0"/>
-            <a:t>10/17/09</a:t>
+            <a:t>Saturday, 10/17/09</a:t>
           </a:r>
           <a:endParaRPr lang="de-DE" sz="1800" kern="1200"/>
         </a:p>
@@ -10974,8 +10954,8 @@
         </a:p>
       </dsp:txBody>
       <dsp:txXfrm>
-        <a:off x="1505709" y="792966"/>
-        <a:ext cx="1024828" cy="100594"/>
+        <a:off x="1508655" y="795912"/>
+        <a:ext cx="1018936" cy="94702"/>
       </dsp:txXfrm>
     </dsp:sp>
     <dsp:sp modelId="{07143B47-B337-4D7B-956E-8A5174C66416}">
@@ -11055,8 +11035,8 @@
         </a:p>
       </dsp:txBody>
       <dsp:txXfrm>
-        <a:off x="1505709" y="830250"/>
-        <a:ext cx="1024828" cy="467271"/>
+        <a:off x="1519395" y="843936"/>
+        <a:ext cx="997456" cy="439899"/>
       </dsp:txXfrm>
     </dsp:sp>
     <dsp:sp modelId="{9B0F7344-B2D3-4F1F-B219-D92C92A21897}">
@@ -11136,8 +11116,8 @@
         </a:p>
       </dsp:txBody>
       <dsp:txXfrm>
-        <a:off x="1505709" y="1369410"/>
-        <a:ext cx="1024828" cy="467271"/>
+        <a:off x="1519395" y="1383096"/>
+        <a:ext cx="997456" cy="439899"/>
       </dsp:txXfrm>
     </dsp:sp>
     <dsp:sp modelId="{4BDE38F7-DA67-42D3-8710-F7C774BDD06B}">
@@ -11217,8 +11197,8 @@
         </a:p>
       </dsp:txBody>
       <dsp:txXfrm>
-        <a:off x="1505709" y="1908570"/>
-        <a:ext cx="1024828" cy="467271"/>
+        <a:off x="1519395" y="1922256"/>
+        <a:ext cx="997456" cy="439899"/>
       </dsp:txXfrm>
     </dsp:sp>
     <dsp:sp modelId="{C49EA062-A2A5-4158-904E-5945C6086208}">
@@ -11275,11 +11255,7 @@
           </a:pPr>
           <a:r>
             <a:rPr lang="de-DE" sz="1800" kern="1200" smtClean="0"/>
-            <a:t>Sunday, </a:t>
-          </a:r>
-          <a:r>
-            <a:rPr lang="de-DE" sz="1800" kern="1200" smtClean="0"/>
-            <a:t>10/18/09</a:t>
+            <a:t>Sunday, 10/18/09</a:t>
           </a:r>
           <a:endParaRPr lang="de-DE" sz="1800" kern="1200"/>
         </a:p>
@@ -11346,8 +11322,8 @@
         </a:p>
       </dsp:txBody>
       <dsp:txXfrm>
-        <a:off x="2882822" y="792966"/>
-        <a:ext cx="1024828" cy="100594"/>
+        <a:off x="2885768" y="795912"/>
+        <a:ext cx="1018936" cy="94702"/>
       </dsp:txXfrm>
     </dsp:sp>
     <dsp:sp modelId="{6A6EFDF1-527A-4470-8A8C-D4C0F52C28A7}">
@@ -11427,8 +11403,8 @@
         </a:p>
       </dsp:txBody>
       <dsp:txXfrm>
-        <a:off x="2882822" y="830250"/>
-        <a:ext cx="1024828" cy="467271"/>
+        <a:off x="2896508" y="843936"/>
+        <a:ext cx="997456" cy="439899"/>
       </dsp:txXfrm>
     </dsp:sp>
     <dsp:sp modelId="{562C62FE-E524-4854-AA9A-CEDFDE8E5818}">
@@ -11508,8 +11484,8 @@
         </a:p>
       </dsp:txBody>
       <dsp:txXfrm>
-        <a:off x="2882822" y="1369410"/>
-        <a:ext cx="1024828" cy="467271"/>
+        <a:off x="2896508" y="1383096"/>
+        <a:ext cx="997456" cy="439899"/>
       </dsp:txXfrm>
     </dsp:sp>
     <dsp:sp modelId="{75473608-B74A-4E5F-B24F-6601E0D58C72}">
@@ -11569,8 +11545,8 @@
         </a:p>
       </dsp:txBody>
       <dsp:txXfrm>
-        <a:off x="2882822" y="2034329"/>
-        <a:ext cx="1024828" cy="467271"/>
+        <a:off x="2896508" y="2048015"/>
+        <a:ext cx="997456" cy="439899"/>
       </dsp:txXfrm>
     </dsp:sp>
   </dsp:spTree>
@@ -11578,7 +11554,7 @@
 </file>
 
 <file path=ppt/diagrams/drawing3.xml><?xml version="1.0" encoding="utf-8"?>
-<dsp:drawing xmlns:dgm="http://schemas.openxmlformats.org/drawingml/2006/diagram" xmlns:a="http://schemas.openxmlformats.org/drawingml/2006/main" xmlns:dsp="http://schemas.microsoft.com/office/drawing/2008/diagram">
+<dsp:drawing xmlns:dgm="http://schemas.openxmlformats.org/drawingml/2006/diagram" xmlns:dsp="http://schemas.microsoft.com/office/drawing/2008/diagram" xmlns:a="http://schemas.openxmlformats.org/drawingml/2006/main">
   <dsp:spTree>
     <dsp:nvGrpSpPr>
       <dsp:cNvPr id="0" name=""/>
@@ -11655,8 +11631,8 @@
         </a:p>
       </dsp:txBody>
       <dsp:txXfrm>
-        <a:off x="3924" y="1935678"/>
-        <a:ext cx="1216501" cy="1343616"/>
+        <a:off x="39554" y="1971308"/>
+        <a:ext cx="1145241" cy="1272356"/>
       </dsp:txXfrm>
     </dsp:sp>
     <dsp:sp modelId="{FB4879E0-D376-444A-8FEA-F8408D6A32A9}">
@@ -11724,8 +11700,8 @@
         </a:p>
       </dsp:txBody>
       <dsp:txXfrm>
-        <a:off x="1335014" y="2456640"/>
-        <a:ext cx="242927" cy="301692"/>
+        <a:off x="1335014" y="2516978"/>
+        <a:ext cx="170049" cy="181016"/>
       </dsp:txXfrm>
     </dsp:sp>
     <dsp:sp modelId="{C6EC3E19-D2F6-497F-B657-749808CA0028}">
@@ -11798,8 +11774,8 @@
         </a:p>
       </dsp:txBody>
       <dsp:txXfrm>
-        <a:off x="1678779" y="1935678"/>
-        <a:ext cx="1216501" cy="1343616"/>
+        <a:off x="1714409" y="1971308"/>
+        <a:ext cx="1145241" cy="1272356"/>
       </dsp:txXfrm>
     </dsp:sp>
     <dsp:sp modelId="{888FE3F8-21A6-4F0F-9554-3DC89BD345DC}">
@@ -11867,8 +11843,8 @@
         </a:p>
       </dsp:txBody>
       <dsp:txXfrm>
-        <a:off x="3019783" y="2456640"/>
-        <a:ext cx="263946" cy="301692"/>
+        <a:off x="3019783" y="2516978"/>
+        <a:ext cx="184762" cy="181016"/>
       </dsp:txXfrm>
     </dsp:sp>
     <dsp:sp modelId="{4D016F65-4A05-44F8-9361-AAD0B272EEDF}">
@@ -11941,8 +11917,8 @@
         </a:p>
       </dsp:txBody>
       <dsp:txXfrm>
-        <a:off x="3393292" y="1935678"/>
-        <a:ext cx="1216501" cy="1343616"/>
+        <a:off x="3428922" y="1971308"/>
+        <a:ext cx="1145241" cy="1272356"/>
       </dsp:txXfrm>
     </dsp:sp>
     <dsp:sp modelId="{6FA5A5A1-59BF-4D24-84B0-047CB5726868}">
@@ -12010,8 +11986,8 @@
         </a:p>
       </dsp:txBody>
       <dsp:txXfrm>
-        <a:off x="4734902" y="2456640"/>
-        <a:ext cx="265230" cy="301692"/>
+        <a:off x="4734902" y="2516978"/>
+        <a:ext cx="185661" cy="181016"/>
       </dsp:txXfrm>
     </dsp:sp>
     <dsp:sp modelId="{81F38DA9-58A3-41DD-9F0E-844EACA7D6A0}">
@@ -12122,8 +12098,8 @@
         </a:p>
       </dsp:txBody>
       <dsp:txXfrm>
-        <a:off x="5110228" y="1935678"/>
-        <a:ext cx="1216501" cy="1343616"/>
+        <a:off x="5145858" y="1971308"/>
+        <a:ext cx="1145241" cy="1272356"/>
       </dsp:txXfrm>
     </dsp:sp>
     <dsp:sp modelId="{0D9814D9-9061-4F9B-B12F-1ECE0B4B61DF}">
@@ -12190,9 +12166,9 @@
           <a:endParaRPr lang="de-DE" sz="1100" kern="1200"/>
         </a:p>
       </dsp:txBody>
-      <dsp:txXfrm rot="2668664">
-        <a:off x="4695294" y="3315998"/>
-        <a:ext cx="286780" cy="301692"/>
+      <dsp:txXfrm rot="10800000">
+        <a:off x="4707617" y="3346197"/>
+        <a:ext cx="200746" cy="181016"/>
       </dsp:txXfrm>
     </dsp:sp>
     <dsp:sp modelId="{525037E8-FA00-4D7A-8B7B-66B1EB308A67}">
@@ -12265,8 +12241,8 @@
         </a:p>
       </dsp:txBody>
       <dsp:txXfrm>
-        <a:off x="5107805" y="3368981"/>
-        <a:ext cx="1216501" cy="1343616"/>
+        <a:off x="5143435" y="3404611"/>
+        <a:ext cx="1145241" cy="1272356"/>
       </dsp:txXfrm>
     </dsp:sp>
   </dsp:spTree>
@@ -12274,7 +12250,7 @@
 </file>
 
 <file path=ppt/diagrams/drawing4.xml><?xml version="1.0" encoding="utf-8"?>
-<dsp:drawing xmlns:dgm="http://schemas.openxmlformats.org/drawingml/2006/diagram" xmlns:a="http://schemas.openxmlformats.org/drawingml/2006/main" xmlns:dsp="http://schemas.microsoft.com/office/drawing/2008/diagram">
+<dsp:drawing xmlns:dgm="http://schemas.openxmlformats.org/drawingml/2006/diagram" xmlns:dsp="http://schemas.microsoft.com/office/drawing/2008/diagram" xmlns:a="http://schemas.openxmlformats.org/drawingml/2006/main">
   <dsp:spTree>
     <dsp:nvGrpSpPr>
       <dsp:cNvPr id="0" name=""/>
@@ -12359,8 +12335,8 @@
         </a:p>
       </dsp:txBody>
       <dsp:txXfrm>
-        <a:off x="3924" y="1928824"/>
-        <a:ext cx="1216501" cy="1357324"/>
+        <a:off x="39554" y="1964454"/>
+        <a:ext cx="1145241" cy="1286064"/>
       </dsp:txXfrm>
     </dsp:sp>
     <dsp:sp modelId="{FB4879E0-D376-444A-8FEA-F8408D6A32A9}">
@@ -12428,8 +12404,8 @@
         </a:p>
       </dsp:txBody>
       <dsp:txXfrm>
-        <a:off x="1335014" y="2456640"/>
-        <a:ext cx="242927" cy="301692"/>
+        <a:off x="1335014" y="2516978"/>
+        <a:ext cx="170049" cy="181016"/>
       </dsp:txXfrm>
     </dsp:sp>
     <dsp:sp modelId="{C6EC3E19-D2F6-497F-B657-749808CA0028}">
@@ -12517,8 +12493,8 @@
         </a:p>
       </dsp:txBody>
       <dsp:txXfrm>
-        <a:off x="1678779" y="1928824"/>
-        <a:ext cx="1216501" cy="1357324"/>
+        <a:off x="1714409" y="1964454"/>
+        <a:ext cx="1145241" cy="1286064"/>
       </dsp:txXfrm>
     </dsp:sp>
     <dsp:sp modelId="{888FE3F8-21A6-4F0F-9554-3DC89BD345DC}">
@@ -12586,8 +12562,8 @@
         </a:p>
       </dsp:txBody>
       <dsp:txXfrm>
-        <a:off x="3019783" y="2456640"/>
-        <a:ext cx="263946" cy="301692"/>
+        <a:off x="3019783" y="2516978"/>
+        <a:ext cx="184762" cy="181016"/>
       </dsp:txXfrm>
     </dsp:sp>
     <dsp:sp modelId="{4D016F65-4A05-44F8-9361-AAD0B272EEDF}">
@@ -12680,8 +12656,8 @@
         </a:p>
       </dsp:txBody>
       <dsp:txXfrm>
-        <a:off x="3393292" y="1928824"/>
-        <a:ext cx="1216501" cy="1357324"/>
+        <a:off x="3428922" y="1964454"/>
+        <a:ext cx="1145241" cy="1286064"/>
       </dsp:txXfrm>
     </dsp:sp>
     <dsp:sp modelId="{6FA5A5A1-59BF-4D24-84B0-047CB5726868}">
@@ -12749,8 +12725,8 @@
         </a:p>
       </dsp:txBody>
       <dsp:txXfrm>
-        <a:off x="4735159" y="2456640"/>
-        <a:ext cx="265774" cy="301692"/>
+        <a:off x="4735159" y="2516978"/>
+        <a:ext cx="186042" cy="181016"/>
       </dsp:txXfrm>
     </dsp:sp>
     <dsp:sp modelId="{81F38DA9-58A3-41DD-9F0E-844EACA7D6A0}">
@@ -12855,8 +12831,8 @@
         </a:p>
       </dsp:txBody>
       <dsp:txXfrm>
-        <a:off x="5111254" y="1928824"/>
-        <a:ext cx="1216501" cy="1357324"/>
+        <a:off x="5146884" y="1964454"/>
+        <a:ext cx="1145241" cy="1286064"/>
       </dsp:txXfrm>
     </dsp:sp>
     <dsp:sp modelId="{0D9814D9-9061-4F9B-B12F-1ECE0B4B61DF}">
@@ -12923,9 +12899,9 @@
           <a:endParaRPr lang="de-DE" sz="1200" kern="1200"/>
         </a:p>
       </dsp:txBody>
-      <dsp:txXfrm rot="13454556" flipH="1">
-        <a:off x="7176868" y="293258"/>
-        <a:ext cx="347070" cy="301692"/>
+      <dsp:txXfrm rot="10800000">
+        <a:off x="7189702" y="322022"/>
+        <a:ext cx="256562" cy="181016"/>
       </dsp:txXfrm>
     </dsp:sp>
     <dsp:sp modelId="{525037E8-FA00-4D7A-8B7B-66B1EB308A67}">
@@ -13038,8 +13014,8 @@
         </a:p>
       </dsp:txBody>
       <dsp:txXfrm>
-        <a:off x="5107806" y="3357584"/>
-        <a:ext cx="1216501" cy="1357324"/>
+        <a:off x="5143436" y="3393214"/>
+        <a:ext cx="1145241" cy="1286064"/>
       </dsp:txXfrm>
     </dsp:sp>
   </dsp:spTree>
@@ -13047,7 +13023,7 @@
 </file>
 
 <file path=ppt/diagrams/drawing5.xml><?xml version="1.0" encoding="utf-8"?>
-<dsp:drawing xmlns:dgm="http://schemas.openxmlformats.org/drawingml/2006/diagram" xmlns:a="http://schemas.openxmlformats.org/drawingml/2006/main" xmlns:dsp="http://schemas.microsoft.com/office/drawing/2008/diagram">
+<dsp:drawing xmlns:dgm="http://schemas.openxmlformats.org/drawingml/2006/diagram" xmlns:dsp="http://schemas.microsoft.com/office/drawing/2008/diagram" xmlns:a="http://schemas.openxmlformats.org/drawingml/2006/main">
   <dsp:spTree>
     <dsp:nvGrpSpPr>
       <dsp:cNvPr id="0" name=""/>
@@ -13124,8 +13100,8 @@
         </a:p>
       </dsp:txBody>
       <dsp:txXfrm>
-        <a:off x="9115" y="2229"/>
-        <a:ext cx="7610884" cy="1064589"/>
+        <a:off x="40296" y="33410"/>
+        <a:ext cx="7548522" cy="1002227"/>
       </dsp:txXfrm>
     </dsp:sp>
     <dsp:sp modelId="{7DF13B49-2E20-44FB-8E6A-FB065603BD36}">
@@ -13199,8 +13175,8 @@
         </a:p>
       </dsp:txBody>
       <dsp:txXfrm>
-        <a:off x="4557" y="1198085"/>
-        <a:ext cx="3729260" cy="1064589"/>
+        <a:off x="35738" y="1229266"/>
+        <a:ext cx="3666898" cy="1002227"/>
       </dsp:txXfrm>
     </dsp:sp>
     <dsp:sp modelId="{650A12E1-8522-4D05-AA2C-4ECA0A47E3FB}">
@@ -13274,8 +13250,8 @@
         </a:p>
       </dsp:txBody>
       <dsp:txXfrm>
-        <a:off x="4557" y="2393941"/>
-        <a:ext cx="1209228" cy="1064589"/>
+        <a:off x="35738" y="2425122"/>
+        <a:ext cx="1146866" cy="1002227"/>
       </dsp:txXfrm>
     </dsp:sp>
     <dsp:sp modelId="{3535F8EB-B400-455A-ADBE-F075582911E2}">
@@ -13349,8 +13325,8 @@
         </a:p>
       </dsp:txBody>
       <dsp:txXfrm>
-        <a:off x="1264573" y="2393941"/>
-        <a:ext cx="1209228" cy="1064589"/>
+        <a:off x="1295754" y="2425122"/>
+        <a:ext cx="1146866" cy="1002227"/>
       </dsp:txXfrm>
     </dsp:sp>
     <dsp:sp modelId="{C338C36F-0FC5-434E-BEB0-F2C582011F19}">
@@ -13424,8 +13400,8 @@
         </a:p>
       </dsp:txBody>
       <dsp:txXfrm>
-        <a:off x="2524590" y="2393941"/>
-        <a:ext cx="1209228" cy="1064589"/>
+        <a:off x="2555771" y="2425122"/>
+        <a:ext cx="1146866" cy="1002227"/>
       </dsp:txXfrm>
     </dsp:sp>
     <dsp:sp modelId="{EBDEC654-6A69-4DB1-9502-97225948F683}">
@@ -13499,8 +13475,8 @@
         </a:p>
       </dsp:txBody>
       <dsp:txXfrm>
-        <a:off x="3835393" y="1198085"/>
-        <a:ext cx="2469244" cy="1064589"/>
+        <a:off x="3866574" y="1229266"/>
+        <a:ext cx="2406882" cy="1002227"/>
       </dsp:txXfrm>
     </dsp:sp>
     <dsp:sp modelId="{E1474752-7981-453A-8AC9-D4BC3EC1A35A}">
@@ -13574,8 +13550,8 @@
         </a:p>
       </dsp:txBody>
       <dsp:txXfrm>
-        <a:off x="3835393" y="2393941"/>
-        <a:ext cx="1209228" cy="1064589"/>
+        <a:off x="3866574" y="2425122"/>
+        <a:ext cx="1146866" cy="1002227"/>
       </dsp:txXfrm>
     </dsp:sp>
     <dsp:sp modelId="{65BB2561-1BFB-4282-9B48-E6B15BBE6760}">
@@ -13649,8 +13625,8 @@
         </a:p>
       </dsp:txBody>
       <dsp:txXfrm>
-        <a:off x="5095409" y="2393941"/>
-        <a:ext cx="1209228" cy="1064589"/>
+        <a:off x="5126590" y="2425122"/>
+        <a:ext cx="1146866" cy="1002227"/>
       </dsp:txXfrm>
     </dsp:sp>
     <dsp:sp modelId="{E45DF21C-76A2-4286-90FB-3ED927B51613}">
@@ -13724,8 +13700,8 @@
         </a:p>
       </dsp:txBody>
       <dsp:txXfrm>
-        <a:off x="6406213" y="1198085"/>
-        <a:ext cx="1209228" cy="1064589"/>
+        <a:off x="6437394" y="1229266"/>
+        <a:ext cx="1146866" cy="1002227"/>
       </dsp:txXfrm>
     </dsp:sp>
   </dsp:spTree>
@@ -13733,7 +13709,7 @@
 </file>
 
 <file path=ppt/diagrams/drawing6.xml><?xml version="1.0" encoding="utf-8"?>
-<dsp:drawing xmlns:dgm="http://schemas.openxmlformats.org/drawingml/2006/diagram" xmlns:a="http://schemas.openxmlformats.org/drawingml/2006/main" xmlns:dsp="http://schemas.microsoft.com/office/drawing/2008/diagram">
+<dsp:drawing xmlns:dgm="http://schemas.openxmlformats.org/drawingml/2006/diagram" xmlns:dsp="http://schemas.microsoft.com/office/drawing/2008/diagram" xmlns:a="http://schemas.openxmlformats.org/drawingml/2006/main">
   <dsp:spTree>
     <dsp:nvGrpSpPr>
       <dsp:cNvPr id="0" name=""/>
@@ -13826,8 +13802,8 @@
         </a:p>
       </dsp:txBody>
       <dsp:txXfrm>
-        <a:off x="9115" y="2229"/>
-        <a:ext cx="7610884" cy="1064589"/>
+        <a:off x="40296" y="33410"/>
+        <a:ext cx="7548522" cy="1002227"/>
       </dsp:txXfrm>
     </dsp:sp>
     <dsp:sp modelId="{7DF13B49-2E20-44FB-8E6A-FB065603BD36}">
@@ -13901,8 +13877,8 @@
         </a:p>
       </dsp:txBody>
       <dsp:txXfrm>
-        <a:off x="4557" y="1198085"/>
-        <a:ext cx="3729260" cy="1064589"/>
+        <a:off x="35738" y="1229266"/>
+        <a:ext cx="3666898" cy="1002227"/>
       </dsp:txXfrm>
     </dsp:sp>
     <dsp:sp modelId="{650A12E1-8522-4D05-AA2C-4ECA0A47E3FB}">
@@ -13976,8 +13952,8 @@
         </a:p>
       </dsp:txBody>
       <dsp:txXfrm>
-        <a:off x="4557" y="2393941"/>
-        <a:ext cx="1209228" cy="1064589"/>
+        <a:off x="35738" y="2425122"/>
+        <a:ext cx="1146866" cy="1002227"/>
       </dsp:txXfrm>
     </dsp:sp>
     <dsp:sp modelId="{3535F8EB-B400-455A-ADBE-F075582911E2}">
@@ -14051,8 +14027,8 @@
         </a:p>
       </dsp:txBody>
       <dsp:txXfrm>
-        <a:off x="1264573" y="2393941"/>
-        <a:ext cx="1209228" cy="1064589"/>
+        <a:off x="1295754" y="2425122"/>
+        <a:ext cx="1146866" cy="1002227"/>
       </dsp:txXfrm>
     </dsp:sp>
     <dsp:sp modelId="{C338C36F-0FC5-434E-BEB0-F2C582011F19}">
@@ -14126,8 +14102,8 @@
         </a:p>
       </dsp:txBody>
       <dsp:txXfrm>
-        <a:off x="2524590" y="2393941"/>
-        <a:ext cx="1209228" cy="1064589"/>
+        <a:off x="2555771" y="2425122"/>
+        <a:ext cx="1146866" cy="1002227"/>
       </dsp:txXfrm>
     </dsp:sp>
     <dsp:sp modelId="{EBDEC654-6A69-4DB1-9502-97225948F683}">
@@ -14201,8 +14177,8 @@
         </a:p>
       </dsp:txBody>
       <dsp:txXfrm>
-        <a:off x="3835393" y="1198085"/>
-        <a:ext cx="2469244" cy="1064589"/>
+        <a:off x="3866574" y="1229266"/>
+        <a:ext cx="2406882" cy="1002227"/>
       </dsp:txXfrm>
     </dsp:sp>
     <dsp:sp modelId="{E1474752-7981-453A-8AC9-D4BC3EC1A35A}">
@@ -14276,8 +14252,8 @@
         </a:p>
       </dsp:txBody>
       <dsp:txXfrm>
-        <a:off x="3835393" y="2393941"/>
-        <a:ext cx="1209228" cy="1064589"/>
+        <a:off x="3866574" y="2425122"/>
+        <a:ext cx="1146866" cy="1002227"/>
       </dsp:txXfrm>
     </dsp:sp>
     <dsp:sp modelId="{65BB2561-1BFB-4282-9B48-E6B15BBE6760}">
@@ -14351,8 +14327,8 @@
         </a:p>
       </dsp:txBody>
       <dsp:txXfrm>
-        <a:off x="5095409" y="2393941"/>
-        <a:ext cx="1209228" cy="1064589"/>
+        <a:off x="5126590" y="2425122"/>
+        <a:ext cx="1146866" cy="1002227"/>
       </dsp:txXfrm>
     </dsp:sp>
     <dsp:sp modelId="{E45DF21C-76A2-4286-90FB-3ED927B51613}">
@@ -14426,8 +14402,8 @@
         </a:p>
       </dsp:txBody>
       <dsp:txXfrm>
-        <a:off x="6406213" y="1198085"/>
-        <a:ext cx="1209228" cy="1064589"/>
+        <a:off x="6437394" y="1229266"/>
+        <a:ext cx="1146866" cy="1002227"/>
       </dsp:txXfrm>
     </dsp:sp>
   </dsp:spTree>
@@ -23029,7 +23005,13 @@
         <p:nvGraphicFramePr>
           <p:cNvPr id="6" name="Diagramm 5"/>
           <p:cNvGraphicFramePr/>
-          <p:nvPr/>
+          <p:nvPr>
+            <p:extLst>
+              <p:ext uri="{D42A27DB-BD31-4B8C-83A1-F6EECF244321}">
+                <p14:modId xmlns:p14="http://schemas.microsoft.com/office/powerpoint/2010/main" val="2389871868"/>
+              </p:ext>
+            </p:extLst>
+          </p:nvPr>
         </p:nvGraphicFramePr>
         <p:xfrm>
           <a:off x="2553877" y="2107397"/>
@@ -23585,7 +23567,7 @@
         <p:spPr>
           <a:xfrm>
             <a:off x="2464578" y="2321711"/>
-            <a:ext cx="5465008" cy="2214578"/>
+            <a:ext cx="4140000" cy="2214578"/>
           </a:xfrm>
           <a:prstGeom prst="roundRect">
             <a:avLst>
@@ -23629,6 +23611,53 @@
       </p:sp>
       <p:pic>
         <p:nvPicPr>
+          <p:cNvPr id="7" name="Picture 3" descr="C:\Users\Torsten Weber\Desktop\Alexander.jpg"/>
+          <p:cNvPicPr>
+            <a:picLocks noChangeAspect="1" noChangeArrowheads="1"/>
+          </p:cNvPicPr>
+          <p:nvPr/>
+        </p:nvPicPr>
+        <p:blipFill>
+          <a:blip r:embed="rId2" cstate="print">
+            <a:duotone>
+              <a:prstClr val="black"/>
+              <a:srgbClr val="A7A075">
+                <a:tint val="45000"/>
+                <a:satMod val="400000"/>
+              </a:srgbClr>
+            </a:duotone>
+            <a:lum bright="10000" contrast="10000"/>
+          </a:blip>
+          <a:srcRect l="4463" r="4245"/>
+          <a:stretch>
+            <a:fillRect/>
+          </a:stretch>
+        </p:blipFill>
+        <p:spPr bwMode="auto">
+          <a:xfrm>
+            <a:off x="5306309" y="2536400"/>
+            <a:ext cx="1094808" cy="1476000"/>
+          </a:xfrm>
+          <a:prstGeom prst="roundRect">
+            <a:avLst>
+              <a:gd name="adj" fmla="val 8594"/>
+            </a:avLst>
+          </a:prstGeom>
+          <a:solidFill>
+            <a:srgbClr val="FFFFFF">
+              <a:shade val="85000"/>
+            </a:srgbClr>
+          </a:solidFill>
+          <a:ln>
+            <a:noFill/>
+          </a:ln>
+          <a:effectLst>
+            <a:reflection blurRad="12700" stA="38000" endPos="28000" dist="5000" dir="5400000" sy="-100000" algn="bl" rotWithShape="0"/>
+          </a:effectLst>
+        </p:spPr>
+      </p:pic>
+      <p:pic>
+        <p:nvPicPr>
           <p:cNvPr id="1026" name="Picture 2" descr="C:\Users\Torsten Weber\Desktop\Torsten.jpg"/>
           <p:cNvPicPr>
             <a:picLocks noChangeAspect="1" noChangeArrowheads="1"/>
@@ -23636,7 +23665,7 @@
           <p:nvPr/>
         </p:nvPicPr>
         <p:blipFill>
-          <a:blip r:embed="rId2" cstate="print">
+          <a:blip r:embed="rId3" cstate="print">
             <a:duotone>
               <a:prstClr val="black"/>
               <a:srgbClr val="A7A075">
@@ -23683,7 +23712,7 @@
           <p:nvPr/>
         </p:nvPicPr>
         <p:blipFill>
-          <a:blip r:embed="rId3" cstate="print">
+          <a:blip r:embed="rId4" cstate="print">
             <a:lum bright="10000" contrast="10000"/>
             <a:duotone>
               <a:prstClr val="black"/>
@@ -23702,100 +23731,6 @@
           <a:xfrm>
             <a:off x="3993614" y="2536025"/>
             <a:ext cx="1093060" cy="1476000"/>
-          </a:xfrm>
-          <a:prstGeom prst="roundRect">
-            <a:avLst>
-              <a:gd name="adj" fmla="val 8594"/>
-            </a:avLst>
-          </a:prstGeom>
-          <a:solidFill>
-            <a:srgbClr val="FFFFFF">
-              <a:shade val="85000"/>
-            </a:srgbClr>
-          </a:solidFill>
-          <a:ln>
-            <a:noFill/>
-          </a:ln>
-          <a:effectLst>
-            <a:reflection blurRad="12700" stA="38000" endPos="28000" dist="5000" dir="5400000" sy="-100000" algn="bl" rotWithShape="0"/>
-          </a:effectLst>
-        </p:spPr>
-      </p:pic>
-      <p:pic>
-        <p:nvPicPr>
-          <p:cNvPr id="1028" name="Picture 4" descr="C:\Users\Torsten Weber\Desktop\Stefan.jpg"/>
-          <p:cNvPicPr>
-            <a:picLocks noChangeAspect="1" noChangeArrowheads="1"/>
-          </p:cNvPicPr>
-          <p:nvPr/>
-        </p:nvPicPr>
-        <p:blipFill>
-          <a:blip r:embed="rId4" cstate="print">
-            <a:duotone>
-              <a:prstClr val="black"/>
-              <a:srgbClr val="A7A075">
-                <a:tint val="45000"/>
-                <a:satMod val="400000"/>
-              </a:srgbClr>
-            </a:duotone>
-            <a:lum bright="10000"/>
-          </a:blip>
-          <a:srcRect/>
-          <a:stretch>
-            <a:fillRect/>
-          </a:stretch>
-        </p:blipFill>
-        <p:spPr bwMode="auto">
-          <a:xfrm>
-            <a:off x="5306020" y="2536025"/>
-            <a:ext cx="1095097" cy="1476000"/>
-          </a:xfrm>
-          <a:prstGeom prst="roundRect">
-            <a:avLst>
-              <a:gd name="adj" fmla="val 8594"/>
-            </a:avLst>
-          </a:prstGeom>
-          <a:solidFill>
-            <a:srgbClr val="FFFFFF">
-              <a:shade val="85000"/>
-            </a:srgbClr>
-          </a:solidFill>
-          <a:ln>
-            <a:noFill/>
-          </a:ln>
-          <a:effectLst>
-            <a:reflection blurRad="12700" stA="38000" endPos="28000" dist="5000" dir="5400000" sy="-100000" algn="bl" rotWithShape="0"/>
-          </a:effectLst>
-        </p:spPr>
-      </p:pic>
-      <p:pic>
-        <p:nvPicPr>
-          <p:cNvPr id="7" name="Picture 3" descr="C:\Users\Torsten Weber\Desktop\Alexander.jpg"/>
-          <p:cNvPicPr>
-            <a:picLocks noChangeAspect="1" noChangeArrowheads="1"/>
-          </p:cNvPicPr>
-          <p:nvPr/>
-        </p:nvPicPr>
-        <p:blipFill>
-          <a:blip r:embed="rId5" cstate="print">
-            <a:duotone>
-              <a:prstClr val="black"/>
-              <a:srgbClr val="A7A075">
-                <a:tint val="45000"/>
-                <a:satMod val="400000"/>
-              </a:srgbClr>
-            </a:duotone>
-            <a:lum bright="10000" contrast="10000"/>
-          </a:blip>
-          <a:srcRect l="4463" r="4245"/>
-          <a:stretch>
-            <a:fillRect/>
-          </a:stretch>
-        </p:blipFill>
-        <p:spPr bwMode="auto">
-          <a:xfrm>
-            <a:off x="6620464" y="2536025"/>
-            <a:ext cx="1094808" cy="1476000"/>
           </a:xfrm>
           <a:prstGeom prst="roundRect">
             <a:avLst>

</xml_diff>